<commit_message>
rename stuff, modify slides
</commit_message>
<xml_diff>
--- a/slides/0 - Intro.pptx
+++ b/slides/0 - Intro.pptx
@@ -5,22 +5,18 @@
     <p:sldMasterId id="2147483648" r:id="rId1"/>
   </p:sldMasterIdLst>
   <p:notesMasterIdLst>
-    <p:notesMasterId r:id="rId15"/>
+    <p:notesMasterId r:id="rId11"/>
   </p:notesMasterIdLst>
   <p:sldIdLst>
     <p:sldId id="256" r:id="rId2"/>
-    <p:sldId id="268" r:id="rId3"/>
-    <p:sldId id="262" r:id="rId4"/>
-    <p:sldId id="263" r:id="rId5"/>
-    <p:sldId id="257" r:id="rId6"/>
-    <p:sldId id="258" r:id="rId7"/>
-    <p:sldId id="259" r:id="rId8"/>
-    <p:sldId id="260" r:id="rId9"/>
-    <p:sldId id="261" r:id="rId10"/>
-    <p:sldId id="264" r:id="rId11"/>
-    <p:sldId id="265" r:id="rId12"/>
-    <p:sldId id="266" r:id="rId13"/>
-    <p:sldId id="267" r:id="rId14"/>
+    <p:sldId id="262" r:id="rId3"/>
+    <p:sldId id="263" r:id="rId4"/>
+    <p:sldId id="257" r:id="rId5"/>
+    <p:sldId id="258" r:id="rId6"/>
+    <p:sldId id="260" r:id="rId7"/>
+    <p:sldId id="264" r:id="rId8"/>
+    <p:sldId id="265" r:id="rId9"/>
+    <p:sldId id="267" r:id="rId10"/>
   </p:sldIdLst>
   <p:sldSz cx="12192000" cy="6858000"/>
   <p:notesSz cx="6858000" cy="9144000"/>
@@ -209,7 +205,7 @@
           <a:p>
             <a:fld id="{8021BC5A-ECE6-4ACB-B1E9-26CEC2D13593}" type="datetimeFigureOut">
               <a:rPr lang="en-US" smtClean="0"/>
-              <a:t>6/21/2016</a:t>
+              <a:t>8/14/2016</a:t>
             </a:fld>
             <a:endParaRPr lang="en-US"/>
           </a:p>
@@ -304,7 +300,6 @@
               <a:rPr lang="en-US"/>
               <a:t>Fifth level</a:t>
             </a:r>
-            <a:endParaRPr lang="en-US"/>
           </a:p>
         </p:txBody>
       </p:sp>
@@ -477,90 +472,6 @@
 </p:notesMaster>
 </file>
 
-<file path=ppt/notesSlides/notesSlide1.xml><?xml version="1.0" encoding="utf-8"?>
-<p:notes xmlns:a="http://schemas.openxmlformats.org/drawingml/2006/main" xmlns:r="http://schemas.openxmlformats.org/officeDocument/2006/relationships" xmlns:p="http://schemas.openxmlformats.org/presentationml/2006/main">
-  <p:cSld>
-    <p:spTree>
-      <p:nvGrpSpPr>
-        <p:cNvPr id="1" name=""/>
-        <p:cNvGrpSpPr/>
-        <p:nvPr/>
-      </p:nvGrpSpPr>
-      <p:grpSpPr>
-        <a:xfrm>
-          <a:off x="0" y="0"/>
-          <a:ext cx="0" cy="0"/>
-          <a:chOff x="0" y="0"/>
-          <a:chExt cx="0" cy="0"/>
-        </a:xfrm>
-      </p:grpSpPr>
-      <p:sp>
-        <p:nvSpPr>
-          <p:cNvPr id="2" name="Slide Image Placeholder 1"/>
-          <p:cNvSpPr>
-            <a:spLocks noGrp="1" noRot="1" noChangeAspect="1"/>
-          </p:cNvSpPr>
-          <p:nvPr>
-            <p:ph type="sldImg"/>
-          </p:nvPr>
-        </p:nvSpPr>
-        <p:spPr/>
-      </p:sp>
-      <p:sp>
-        <p:nvSpPr>
-          <p:cNvPr id="3" name="Notes Placeholder 2"/>
-          <p:cNvSpPr>
-            <a:spLocks noGrp="1"/>
-          </p:cNvSpPr>
-          <p:nvPr>
-            <p:ph type="body" idx="1"/>
-          </p:nvPr>
-        </p:nvSpPr>
-        <p:spPr/>
-        <p:txBody>
-          <a:bodyPr/>
-          <a:lstStyle/>
-          <a:p>
-            <a:endParaRPr lang="en-US" dirty="0"/>
-          </a:p>
-        </p:txBody>
-      </p:sp>
-      <p:sp>
-        <p:nvSpPr>
-          <p:cNvPr id="4" name="Slide Number Placeholder 3"/>
-          <p:cNvSpPr>
-            <a:spLocks noGrp="1"/>
-          </p:cNvSpPr>
-          <p:nvPr>
-            <p:ph type="sldNum" sz="quarter" idx="10"/>
-          </p:nvPr>
-        </p:nvSpPr>
-        <p:spPr/>
-        <p:txBody>
-          <a:bodyPr/>
-          <a:lstStyle/>
-          <a:p>
-            <a:fld id="{2BD1BC4C-DBBA-1A46-BD21-33C27A89343E}" type="slidenum">
-              <a:rPr lang="en-US" smtClean="0"/>
-              <a:t>2</a:t>
-            </a:fld>
-            <a:endParaRPr lang="en-US"/>
-          </a:p>
-        </p:txBody>
-      </p:sp>
-    </p:spTree>
-    <p:extLst>
-      <p:ext uri="{BB962C8B-B14F-4D97-AF65-F5344CB8AC3E}">
-        <p14:creationId xmlns:p14="http://schemas.microsoft.com/office/powerpoint/2010/main" val="3560666514"/>
-      </p:ext>
-    </p:extLst>
-  </p:cSld>
-  <p:clrMapOvr>
-    <a:masterClrMapping/>
-  </p:clrMapOvr>
-</p:notes>
-</file>
-
 <file path=ppt/slideLayouts/slideLayout1.xml><?xml version="1.0" encoding="utf-8"?>
 <p:sldLayout xmlns:a="http://schemas.openxmlformats.org/drawingml/2006/main" xmlns:r="http://schemas.openxmlformats.org/officeDocument/2006/relationships" xmlns:p="http://schemas.openxmlformats.org/presentationml/2006/main" type="title" preserve="1">
   <p:cSld name="Title Slide">
@@ -690,7 +601,7 @@
           <a:p>
             <a:fld id="{439942A9-1996-4F0E-91DE-9551B2F53D19}" type="datetimeFigureOut">
               <a:rPr lang="en-US" smtClean="0"/>
-              <a:t>6/21/2016</a:t>
+              <a:t>8/14/2016</a:t>
             </a:fld>
             <a:endParaRPr lang="en-US"/>
           </a:p>
@@ -858,7 +769,7 @@
           <a:p>
             <a:fld id="{439942A9-1996-4F0E-91DE-9551B2F53D19}" type="datetimeFigureOut">
               <a:rPr lang="en-US" smtClean="0"/>
-              <a:t>6/21/2016</a:t>
+              <a:t>8/14/2016</a:t>
             </a:fld>
             <a:endParaRPr lang="en-US"/>
           </a:p>
@@ -1036,7 +947,7 @@
           <a:p>
             <a:fld id="{439942A9-1996-4F0E-91DE-9551B2F53D19}" type="datetimeFigureOut">
               <a:rPr lang="en-US" smtClean="0"/>
-              <a:t>6/21/2016</a:t>
+              <a:t>8/14/2016</a:t>
             </a:fld>
             <a:endParaRPr lang="en-US"/>
           </a:p>
@@ -1204,7 +1115,7 @@
           <a:p>
             <a:fld id="{439942A9-1996-4F0E-91DE-9551B2F53D19}" type="datetimeFigureOut">
               <a:rPr lang="en-US" smtClean="0"/>
-              <a:t>6/21/2016</a:t>
+              <a:t>8/14/2016</a:t>
             </a:fld>
             <a:endParaRPr lang="en-US"/>
           </a:p>
@@ -1449,7 +1360,7 @@
           <a:p>
             <a:fld id="{439942A9-1996-4F0E-91DE-9551B2F53D19}" type="datetimeFigureOut">
               <a:rPr lang="en-US" smtClean="0"/>
-              <a:t>6/21/2016</a:t>
+              <a:t>8/14/2016</a:t>
             </a:fld>
             <a:endParaRPr lang="en-US"/>
           </a:p>
@@ -1678,7 +1589,7 @@
           <a:p>
             <a:fld id="{439942A9-1996-4F0E-91DE-9551B2F53D19}" type="datetimeFigureOut">
               <a:rPr lang="en-US" smtClean="0"/>
-              <a:t>6/21/2016</a:t>
+              <a:t>8/14/2016</a:t>
             </a:fld>
             <a:endParaRPr lang="en-US"/>
           </a:p>
@@ -2042,7 +1953,7 @@
           <a:p>
             <a:fld id="{439942A9-1996-4F0E-91DE-9551B2F53D19}" type="datetimeFigureOut">
               <a:rPr lang="en-US" smtClean="0"/>
-              <a:t>6/21/2016</a:t>
+              <a:t>8/14/2016</a:t>
             </a:fld>
             <a:endParaRPr lang="en-US"/>
           </a:p>
@@ -2159,7 +2070,7 @@
           <a:p>
             <a:fld id="{439942A9-1996-4F0E-91DE-9551B2F53D19}" type="datetimeFigureOut">
               <a:rPr lang="en-US" smtClean="0"/>
-              <a:t>6/21/2016</a:t>
+              <a:t>8/14/2016</a:t>
             </a:fld>
             <a:endParaRPr lang="en-US"/>
           </a:p>
@@ -2254,7 +2165,7 @@
           <a:p>
             <a:fld id="{439942A9-1996-4F0E-91DE-9551B2F53D19}" type="datetimeFigureOut">
               <a:rPr lang="en-US" smtClean="0"/>
-              <a:t>6/21/2016</a:t>
+              <a:t>8/14/2016</a:t>
             </a:fld>
             <a:endParaRPr lang="en-US"/>
           </a:p>
@@ -2529,7 +2440,7 @@
           <a:p>
             <a:fld id="{439942A9-1996-4F0E-91DE-9551B2F53D19}" type="datetimeFigureOut">
               <a:rPr lang="en-US" smtClean="0"/>
-              <a:t>6/21/2016</a:t>
+              <a:t>8/14/2016</a:t>
             </a:fld>
             <a:endParaRPr lang="en-US"/>
           </a:p>
@@ -2781,7 +2692,7 @@
           <a:p>
             <a:fld id="{439942A9-1996-4F0E-91DE-9551B2F53D19}" type="datetimeFigureOut">
               <a:rPr lang="en-US" smtClean="0"/>
-              <a:t>6/21/2016</a:t>
+              <a:t>8/14/2016</a:t>
             </a:fld>
             <a:endParaRPr lang="en-US"/>
           </a:p>
@@ -2992,7 +2903,7 @@
           <a:p>
             <a:fld id="{439942A9-1996-4F0E-91DE-9551B2F53D19}" type="datetimeFigureOut">
               <a:rPr lang="en-US" smtClean="0"/>
-              <a:t>6/21/2016</a:t>
+              <a:t>8/14/2016</a:t>
             </a:fld>
             <a:endParaRPr lang="en-US"/>
           </a:p>
@@ -3441,10 +3352,7 @@
           </a:bodyPr>
           <a:lstStyle/>
           <a:p>
-            <a:r>
-              <a:rPr lang="en-US" sz="2000" dirty="0"/>
-              <a:t>KCDC 2016</a:t>
-            </a:r>
+            <a:endParaRPr lang="en-US" dirty="0"/>
           </a:p>
           <a:p>
             <a:endParaRPr lang="en-US" dirty="0"/>
@@ -3477,7 +3385,757 @@
 </p:sld>
 </file>
 
-<file path=ppt/slides/slide10.xml><?xml version="1.0" encoding="utf-8"?>
+<file path=ppt/slides/slide2.xml><?xml version="1.0" encoding="utf-8"?>
+<p:sld xmlns:a="http://schemas.openxmlformats.org/drawingml/2006/main" xmlns:r="http://schemas.openxmlformats.org/officeDocument/2006/relationships" xmlns:p="http://schemas.openxmlformats.org/presentationml/2006/main">
+  <p:cSld>
+    <p:spTree>
+      <p:nvGrpSpPr>
+        <p:cNvPr id="1" name=""/>
+        <p:cNvGrpSpPr/>
+        <p:nvPr/>
+      </p:nvGrpSpPr>
+      <p:grpSpPr>
+        <a:xfrm>
+          <a:off x="0" y="0"/>
+          <a:ext cx="0" cy="0"/>
+          <a:chOff x="0" y="0"/>
+          <a:chExt cx="0" cy="0"/>
+        </a:xfrm>
+      </p:grpSpPr>
+      <p:sp>
+        <p:nvSpPr>
+          <p:cNvPr id="2" name="Title 1"/>
+          <p:cNvSpPr>
+            <a:spLocks noGrp="1"/>
+          </p:cNvSpPr>
+          <p:nvPr>
+            <p:ph type="title"/>
+          </p:nvPr>
+        </p:nvSpPr>
+        <p:spPr/>
+        <p:txBody>
+          <a:bodyPr/>
+          <a:lstStyle/>
+          <a:p>
+            <a:r>
+              <a:rPr lang="en-US" dirty="0"/>
+              <a:t>First things first</a:t>
+            </a:r>
+          </a:p>
+        </p:txBody>
+      </p:sp>
+      <p:sp>
+        <p:nvSpPr>
+          <p:cNvPr id="3" name="Content Placeholder 2"/>
+          <p:cNvSpPr>
+            <a:spLocks noGrp="1"/>
+          </p:cNvSpPr>
+          <p:nvPr>
+            <p:ph idx="1"/>
+          </p:nvPr>
+        </p:nvSpPr>
+        <p:spPr/>
+        <p:txBody>
+          <a:bodyPr/>
+          <a:lstStyle/>
+          <a:p>
+            <a:pPr marL="0" indent="0">
+              <a:buNone/>
+            </a:pPr>
+            <a:endParaRPr lang="en-US" dirty="0"/>
+          </a:p>
+          <a:p>
+            <a:pPr marL="0" indent="0">
+              <a:buNone/>
+            </a:pPr>
+            <a:endParaRPr lang="en-US" dirty="0"/>
+          </a:p>
+          <a:p>
+            <a:pPr marL="0" indent="0" algn="ctr">
+              <a:buNone/>
+            </a:pPr>
+            <a:r>
+              <a:rPr lang="en-US" sz="5400" dirty="0"/>
+              <a:t>Code, links, and more at</a:t>
+            </a:r>
+          </a:p>
+          <a:p>
+            <a:pPr marL="0" indent="0" algn="ctr">
+              <a:buNone/>
+            </a:pPr>
+            <a:r>
+              <a:rPr lang="en-US" sz="5400" dirty="0">
+                <a:hlinkClick r:id="rId2"/>
+              </a:rPr>
+              <a:t>angular2.schneids.net</a:t>
+            </a:r>
+            <a:endParaRPr lang="en-US" sz="5400" dirty="0"/>
+          </a:p>
+        </p:txBody>
+      </p:sp>
+    </p:spTree>
+    <p:extLst>
+      <p:ext uri="{BB962C8B-B14F-4D97-AF65-F5344CB8AC3E}">
+        <p14:creationId xmlns:p14="http://schemas.microsoft.com/office/powerpoint/2010/main" val="938819649"/>
+      </p:ext>
+    </p:extLst>
+  </p:cSld>
+  <p:clrMapOvr>
+    <a:masterClrMapping/>
+  </p:clrMapOvr>
+</p:sld>
+</file>
+
+<file path=ppt/slides/slide3.xml><?xml version="1.0" encoding="utf-8"?>
+<p:sld xmlns:a="http://schemas.openxmlformats.org/drawingml/2006/main" xmlns:r="http://schemas.openxmlformats.org/officeDocument/2006/relationships" xmlns:p="http://schemas.openxmlformats.org/presentationml/2006/main">
+  <p:cSld>
+    <p:spTree>
+      <p:nvGrpSpPr>
+        <p:cNvPr id="1" name=""/>
+        <p:cNvGrpSpPr/>
+        <p:nvPr/>
+      </p:nvGrpSpPr>
+      <p:grpSpPr>
+        <a:xfrm>
+          <a:off x="0" y="0"/>
+          <a:ext cx="0" cy="0"/>
+          <a:chOff x="0" y="0"/>
+          <a:chExt cx="0" cy="0"/>
+        </a:xfrm>
+      </p:grpSpPr>
+      <p:sp>
+        <p:nvSpPr>
+          <p:cNvPr id="2" name="Title 1"/>
+          <p:cNvSpPr>
+            <a:spLocks noGrp="1"/>
+          </p:cNvSpPr>
+          <p:nvPr>
+            <p:ph type="title"/>
+          </p:nvPr>
+        </p:nvSpPr>
+        <p:spPr/>
+        <p:txBody>
+          <a:bodyPr/>
+          <a:lstStyle/>
+          <a:p>
+            <a:r>
+              <a:rPr lang="en-US" dirty="0"/>
+              <a:t>About Me</a:t>
+            </a:r>
+          </a:p>
+        </p:txBody>
+      </p:sp>
+      <p:sp>
+        <p:nvSpPr>
+          <p:cNvPr id="3" name="Content Placeholder 2"/>
+          <p:cNvSpPr>
+            <a:spLocks noGrp="1"/>
+          </p:cNvSpPr>
+          <p:nvPr>
+            <p:ph idx="1"/>
+          </p:nvPr>
+        </p:nvSpPr>
+        <p:spPr/>
+        <p:txBody>
+          <a:bodyPr>
+            <a:normAutofit fontScale="92500" lnSpcReduction="10000"/>
+          </a:bodyPr>
+          <a:lstStyle/>
+          <a:p>
+            <a:r>
+              <a:rPr lang="en-US" dirty="0"/>
+              <a:t>Platform Architect at </a:t>
+            </a:r>
+            <a:r>
+              <a:rPr lang="en-US" dirty="0" err="1"/>
+              <a:t>Ryvit</a:t>
+            </a:r>
+            <a:endParaRPr lang="en-US" dirty="0"/>
+          </a:p>
+          <a:p>
+            <a:r>
+              <a:rPr lang="en-US" dirty="0"/>
+              <a:t>Consultant</a:t>
+            </a:r>
+          </a:p>
+          <a:p>
+            <a:r>
+              <a:rPr lang="en-US" dirty="0"/>
+              <a:t>Web developer</a:t>
+            </a:r>
+          </a:p>
+          <a:p>
+            <a:r>
+              <a:rPr lang="en-US" dirty="0"/>
+              <a:t>AngularJS 1/2, ASP.NET, C#</a:t>
+            </a:r>
+          </a:p>
+          <a:p>
+            <a:endParaRPr lang="en-US" dirty="0"/>
+          </a:p>
+          <a:p>
+            <a:pPr marL="0" indent="0">
+              <a:spcAft>
+                <a:spcPts val="500"/>
+              </a:spcAft>
+              <a:buNone/>
+            </a:pPr>
+            <a:r>
+              <a:rPr lang="en-US" dirty="0"/>
+              <a:t>	schneids.net</a:t>
+            </a:r>
+          </a:p>
+          <a:p>
+            <a:pPr marL="0" indent="0">
+              <a:spcAft>
+                <a:spcPts val="500"/>
+              </a:spcAft>
+              <a:buNone/>
+            </a:pPr>
+            <a:r>
+              <a:rPr lang="en-US" dirty="0"/>
+              <a:t>	@</a:t>
+            </a:r>
+            <a:r>
+              <a:rPr lang="en-US" dirty="0" err="1"/>
+              <a:t>schneidenbach</a:t>
+            </a:r>
+            <a:endParaRPr lang="en-US" dirty="0"/>
+          </a:p>
+          <a:p>
+            <a:pPr marL="0" indent="0">
+              <a:spcAft>
+                <a:spcPts val="500"/>
+              </a:spcAft>
+              <a:buNone/>
+            </a:pPr>
+            <a:r>
+              <a:rPr lang="en-US" dirty="0"/>
+              <a:t>	</a:t>
+            </a:r>
+            <a:r>
+              <a:rPr lang="en-US" dirty="0" err="1"/>
+              <a:t>schneidenbach</a:t>
+            </a:r>
+            <a:endParaRPr lang="en-US" dirty="0"/>
+          </a:p>
+          <a:p>
+            <a:pPr marL="0" indent="0">
+              <a:spcAft>
+                <a:spcPts val="500"/>
+              </a:spcAft>
+              <a:buNone/>
+            </a:pPr>
+            <a:r>
+              <a:rPr lang="en-US" dirty="0"/>
+              <a:t>	sas.projects@me.com</a:t>
+            </a:r>
+          </a:p>
+        </p:txBody>
+      </p:sp>
+      <p:pic>
+        <p:nvPicPr>
+          <p:cNvPr id="4" name="Picture 3"/>
+          <p:cNvPicPr>
+            <a:picLocks noChangeAspect="1"/>
+          </p:cNvPicPr>
+          <p:nvPr/>
+        </p:nvPicPr>
+        <p:blipFill>
+          <a:blip r:embed="rId2"/>
+          <a:stretch>
+            <a:fillRect/>
+          </a:stretch>
+        </p:blipFill>
+        <p:spPr>
+          <a:xfrm>
+            <a:off x="7219164" y="3589117"/>
+            <a:ext cx="4007904" cy="2134208"/>
+          </a:xfrm>
+          <a:prstGeom prst="rect">
+            <a:avLst/>
+          </a:prstGeom>
+        </p:spPr>
+      </p:pic>
+      <p:pic>
+        <p:nvPicPr>
+          <p:cNvPr id="5" name="Picture 4"/>
+          <p:cNvPicPr>
+            <a:picLocks noChangeAspect="1"/>
+          </p:cNvPicPr>
+          <p:nvPr/>
+        </p:nvPicPr>
+        <p:blipFill>
+          <a:blip r:embed="rId3"/>
+          <a:stretch>
+            <a:fillRect/>
+          </a:stretch>
+        </p:blipFill>
+        <p:spPr>
+          <a:xfrm>
+            <a:off x="1216849" y="4550798"/>
+            <a:ext cx="366555" cy="366555"/>
+          </a:xfrm>
+          <a:prstGeom prst="rect">
+            <a:avLst/>
+          </a:prstGeom>
+        </p:spPr>
+      </p:pic>
+      <p:pic>
+        <p:nvPicPr>
+          <p:cNvPr id="6" name="Picture 5"/>
+          <p:cNvPicPr>
+            <a:picLocks noChangeAspect="1"/>
+          </p:cNvPicPr>
+          <p:nvPr/>
+        </p:nvPicPr>
+        <p:blipFill>
+          <a:blip r:embed="rId4"/>
+          <a:stretch>
+            <a:fillRect/>
+          </a:stretch>
+        </p:blipFill>
+        <p:spPr>
+          <a:xfrm>
+            <a:off x="1211797" y="5573775"/>
+            <a:ext cx="364031" cy="364031"/>
+          </a:xfrm>
+          <a:prstGeom prst="rect">
+            <a:avLst/>
+          </a:prstGeom>
+        </p:spPr>
+      </p:pic>
+      <p:pic>
+        <p:nvPicPr>
+          <p:cNvPr id="7" name="Picture 6"/>
+          <p:cNvPicPr>
+            <a:picLocks noChangeAspect="1"/>
+          </p:cNvPicPr>
+          <p:nvPr/>
+        </p:nvPicPr>
+        <p:blipFill>
+          <a:blip r:embed="rId5"/>
+          <a:stretch>
+            <a:fillRect/>
+          </a:stretch>
+        </p:blipFill>
+        <p:spPr>
+          <a:xfrm>
+            <a:off x="1211797" y="5052290"/>
+            <a:ext cx="398011" cy="398011"/>
+          </a:xfrm>
+          <a:prstGeom prst="rect">
+            <a:avLst/>
+          </a:prstGeom>
+        </p:spPr>
+      </p:pic>
+      <p:pic>
+        <p:nvPicPr>
+          <p:cNvPr id="8" name="Picture 7"/>
+          <p:cNvPicPr>
+            <a:picLocks noChangeAspect="1"/>
+          </p:cNvPicPr>
+          <p:nvPr/>
+        </p:nvPicPr>
+        <p:blipFill>
+          <a:blip r:embed="rId6">
+            <a:extLst>
+              <a:ext uri="{28A0092B-C50C-407E-A947-70E740481C1C}">
+                <a14:useLocalDpi xmlns:a14="http://schemas.microsoft.com/office/drawing/2010/main" val="0"/>
+              </a:ext>
+            </a:extLst>
+          </a:blip>
+          <a:stretch>
+            <a:fillRect/>
+          </a:stretch>
+        </p:blipFill>
+        <p:spPr>
+          <a:xfrm>
+            <a:off x="1245779" y="4083082"/>
+            <a:ext cx="296069" cy="296069"/>
+          </a:xfrm>
+          <a:prstGeom prst="rect">
+            <a:avLst/>
+          </a:prstGeom>
+        </p:spPr>
+      </p:pic>
+    </p:spTree>
+    <p:extLst>
+      <p:ext uri="{BB962C8B-B14F-4D97-AF65-F5344CB8AC3E}">
+        <p14:creationId xmlns:p14="http://schemas.microsoft.com/office/powerpoint/2010/main" val="2648786204"/>
+      </p:ext>
+    </p:extLst>
+  </p:cSld>
+  <p:clrMapOvr>
+    <a:masterClrMapping/>
+  </p:clrMapOvr>
+</p:sld>
+</file>
+
+<file path=ppt/slides/slide4.xml><?xml version="1.0" encoding="utf-8"?>
+<p:sld xmlns:a="http://schemas.openxmlformats.org/drawingml/2006/main" xmlns:r="http://schemas.openxmlformats.org/officeDocument/2006/relationships" xmlns:p="http://schemas.openxmlformats.org/presentationml/2006/main">
+  <p:cSld>
+    <p:spTree>
+      <p:nvGrpSpPr>
+        <p:cNvPr id="1" name=""/>
+        <p:cNvGrpSpPr/>
+        <p:nvPr/>
+      </p:nvGrpSpPr>
+      <p:grpSpPr>
+        <a:xfrm>
+          <a:off x="0" y="0"/>
+          <a:ext cx="0" cy="0"/>
+          <a:chOff x="0" y="0"/>
+          <a:chExt cx="0" cy="0"/>
+        </a:xfrm>
+      </p:grpSpPr>
+      <p:sp>
+        <p:nvSpPr>
+          <p:cNvPr id="2" name="Title 1"/>
+          <p:cNvSpPr>
+            <a:spLocks noGrp="1"/>
+          </p:cNvSpPr>
+          <p:nvPr>
+            <p:ph type="title"/>
+          </p:nvPr>
+        </p:nvSpPr>
+        <p:spPr/>
+        <p:txBody>
+          <a:bodyPr/>
+          <a:lstStyle/>
+          <a:p>
+            <a:r>
+              <a:rPr lang="en-US" dirty="0"/>
+              <a:t>Who are you to tell me???</a:t>
+            </a:r>
+          </a:p>
+        </p:txBody>
+      </p:sp>
+      <p:sp>
+        <p:nvSpPr>
+          <p:cNvPr id="3" name="Content Placeholder 2"/>
+          <p:cNvSpPr>
+            <a:spLocks noGrp="1"/>
+          </p:cNvSpPr>
+          <p:nvPr>
+            <p:ph idx="1"/>
+          </p:nvPr>
+        </p:nvSpPr>
+        <p:spPr/>
+        <p:txBody>
+          <a:bodyPr/>
+          <a:lstStyle/>
+          <a:p>
+            <a:r>
+              <a:rPr lang="en-US" dirty="0"/>
+              <a:t>Building SPAs for 4 years</a:t>
+            </a:r>
+          </a:p>
+          <a:p>
+            <a:r>
+              <a:rPr lang="en-US" dirty="0"/>
+              <a:t>Started with Angular 1 and ASP.NET Web API</a:t>
+            </a:r>
+          </a:p>
+          <a:p>
+            <a:r>
+              <a:rPr lang="en-US" dirty="0"/>
+              <a:t>Using Angular 2 in production today</a:t>
+            </a:r>
+          </a:p>
+        </p:txBody>
+      </p:sp>
+    </p:spTree>
+    <p:extLst>
+      <p:ext uri="{BB962C8B-B14F-4D97-AF65-F5344CB8AC3E}">
+        <p14:creationId xmlns:p14="http://schemas.microsoft.com/office/powerpoint/2010/main" val="2237232038"/>
+      </p:ext>
+    </p:extLst>
+  </p:cSld>
+  <p:clrMapOvr>
+    <a:masterClrMapping/>
+  </p:clrMapOvr>
+</p:sld>
+</file>
+
+<file path=ppt/slides/slide5.xml><?xml version="1.0" encoding="utf-8"?>
+<p:sld xmlns:a="http://schemas.openxmlformats.org/drawingml/2006/main" xmlns:r="http://schemas.openxmlformats.org/officeDocument/2006/relationships" xmlns:p="http://schemas.openxmlformats.org/presentationml/2006/main">
+  <p:cSld>
+    <p:spTree>
+      <p:nvGrpSpPr>
+        <p:cNvPr id="1" name=""/>
+        <p:cNvGrpSpPr/>
+        <p:nvPr/>
+      </p:nvGrpSpPr>
+      <p:grpSpPr>
+        <a:xfrm>
+          <a:off x="0" y="0"/>
+          <a:ext cx="0" cy="0"/>
+          <a:chOff x="0" y="0"/>
+          <a:chExt cx="0" cy="0"/>
+        </a:xfrm>
+      </p:grpSpPr>
+      <p:sp>
+        <p:nvSpPr>
+          <p:cNvPr id="2" name="Title 1"/>
+          <p:cNvSpPr>
+            <a:spLocks noGrp="1"/>
+          </p:cNvSpPr>
+          <p:nvPr>
+            <p:ph type="title"/>
+          </p:nvPr>
+        </p:nvSpPr>
+        <p:spPr/>
+        <p:txBody>
+          <a:bodyPr/>
+          <a:lstStyle/>
+          <a:p>
+            <a:r>
+              <a:rPr lang="en-US" dirty="0"/>
+              <a:t>So, why Angular 2?</a:t>
+            </a:r>
+          </a:p>
+        </p:txBody>
+      </p:sp>
+      <p:sp>
+        <p:nvSpPr>
+          <p:cNvPr id="3" name="Content Placeholder 2"/>
+          <p:cNvSpPr>
+            <a:spLocks noGrp="1"/>
+          </p:cNvSpPr>
+          <p:nvPr>
+            <p:ph idx="1"/>
+          </p:nvPr>
+        </p:nvSpPr>
+        <p:spPr/>
+        <p:txBody>
+          <a:bodyPr/>
+          <a:lstStyle/>
+          <a:p>
+            <a:r>
+              <a:rPr lang="en-US" dirty="0"/>
+              <a:t>Simpler</a:t>
+            </a:r>
+          </a:p>
+          <a:p>
+            <a:r>
+              <a:rPr lang="en-US" dirty="0"/>
+              <a:t>Faster</a:t>
+            </a:r>
+          </a:p>
+          <a:p>
+            <a:r>
+              <a:rPr lang="en-US" dirty="0"/>
+              <a:t>More powerful</a:t>
+            </a:r>
+          </a:p>
+        </p:txBody>
+      </p:sp>
+      <p:pic>
+        <p:nvPicPr>
+          <p:cNvPr id="6146" name="Picture 2" descr="https://angular.io/resources/images/logos/standard/shield-large.png"/>
+          <p:cNvPicPr>
+            <a:picLocks noChangeAspect="1" noChangeArrowheads="1"/>
+          </p:cNvPicPr>
+          <p:nvPr/>
+        </p:nvPicPr>
+        <p:blipFill>
+          <a:blip r:embed="rId2">
+            <a:extLst>
+              <a:ext uri="{28A0092B-C50C-407E-A947-70E740481C1C}">
+                <a14:useLocalDpi xmlns:a14="http://schemas.microsoft.com/office/drawing/2010/main" val="0"/>
+              </a:ext>
+            </a:extLst>
+          </a:blip>
+          <a:srcRect/>
+          <a:stretch>
+            <a:fillRect/>
+          </a:stretch>
+        </p:blipFill>
+        <p:spPr bwMode="auto">
+          <a:xfrm>
+            <a:off x="8777061" y="3638938"/>
+            <a:ext cx="1752600" cy="1905000"/>
+          </a:xfrm>
+          <a:prstGeom prst="rect">
+            <a:avLst/>
+          </a:prstGeom>
+          <a:noFill/>
+          <a:extLst>
+            <a:ext uri="{909E8E84-426E-40DD-AFC4-6F175D3DCCD1}">
+              <a14:hiddenFill xmlns:a14="http://schemas.microsoft.com/office/drawing/2010/main">
+                <a:solidFill>
+                  <a:srgbClr val="FFFFFF"/>
+                </a:solidFill>
+              </a14:hiddenFill>
+            </a:ext>
+          </a:extLst>
+        </p:spPr>
+      </p:pic>
+    </p:spTree>
+    <p:extLst>
+      <p:ext uri="{BB962C8B-B14F-4D97-AF65-F5344CB8AC3E}">
+        <p14:creationId xmlns:p14="http://schemas.microsoft.com/office/powerpoint/2010/main" val="3022462997"/>
+      </p:ext>
+    </p:extLst>
+  </p:cSld>
+  <p:clrMapOvr>
+    <a:masterClrMapping/>
+  </p:clrMapOvr>
+</p:sld>
+</file>
+
+<file path=ppt/slides/slide6.xml><?xml version="1.0" encoding="utf-8"?>
+<p:sld xmlns:a="http://schemas.openxmlformats.org/drawingml/2006/main" xmlns:r="http://schemas.openxmlformats.org/officeDocument/2006/relationships" xmlns:p="http://schemas.openxmlformats.org/presentationml/2006/main">
+  <p:cSld>
+    <p:spTree>
+      <p:nvGrpSpPr>
+        <p:cNvPr id="1" name=""/>
+        <p:cNvGrpSpPr/>
+        <p:nvPr/>
+      </p:nvGrpSpPr>
+      <p:grpSpPr>
+        <a:xfrm>
+          <a:off x="0" y="0"/>
+          <a:ext cx="0" cy="0"/>
+          <a:chOff x="0" y="0"/>
+          <a:chExt cx="0" cy="0"/>
+        </a:xfrm>
+      </p:grpSpPr>
+      <p:sp>
+        <p:nvSpPr>
+          <p:cNvPr id="2" name="Title 1"/>
+          <p:cNvSpPr>
+            <a:spLocks noGrp="1"/>
+          </p:cNvSpPr>
+          <p:nvPr>
+            <p:ph type="title"/>
+          </p:nvPr>
+        </p:nvSpPr>
+        <p:spPr/>
+        <p:txBody>
+          <a:bodyPr/>
+          <a:lstStyle/>
+          <a:p>
+            <a:r>
+              <a:rPr lang="en-US" dirty="0"/>
+              <a:t>Why </a:t>
+            </a:r>
+            <a:r>
+              <a:rPr lang="en-US" dirty="0" err="1"/>
+              <a:t>TypeScript</a:t>
+            </a:r>
+            <a:r>
+              <a:rPr lang="en-US" dirty="0"/>
+              <a:t>?</a:t>
+            </a:r>
+          </a:p>
+        </p:txBody>
+      </p:sp>
+      <p:sp>
+        <p:nvSpPr>
+          <p:cNvPr id="3" name="Content Placeholder 2"/>
+          <p:cNvSpPr>
+            <a:spLocks noGrp="1"/>
+          </p:cNvSpPr>
+          <p:nvPr>
+            <p:ph idx="1"/>
+          </p:nvPr>
+        </p:nvSpPr>
+        <p:spPr/>
+        <p:txBody>
+          <a:bodyPr/>
+          <a:lstStyle/>
+          <a:p>
+            <a:r>
+              <a:rPr lang="en-US" dirty="0"/>
+              <a:t>De facto language for Angular 2</a:t>
+            </a:r>
+          </a:p>
+          <a:p>
+            <a:r>
+              <a:rPr lang="en-US" dirty="0"/>
+              <a:t>Lots of neat features</a:t>
+            </a:r>
+          </a:p>
+          <a:p>
+            <a:r>
+              <a:rPr lang="en-US" dirty="0"/>
+              <a:t>The future </a:t>
+            </a:r>
+            <a:r>
+              <a:rPr lang="en-US"/>
+              <a:t>of JavaScript, today</a:t>
+            </a:r>
+            <a:endParaRPr lang="en-US" dirty="0"/>
+          </a:p>
+          <a:p>
+            <a:r>
+              <a:rPr lang="en-US" dirty="0" err="1"/>
+              <a:t>AtScript</a:t>
+            </a:r>
+            <a:r>
+              <a:rPr lang="en-US" dirty="0"/>
+              <a:t> history</a:t>
+            </a:r>
+          </a:p>
+        </p:txBody>
+      </p:sp>
+      <p:pic>
+        <p:nvPicPr>
+          <p:cNvPr id="5122" name="Picture 2" descr="https://raw.githubusercontent.com/remojansen/logo.ts/master/ts.png"/>
+          <p:cNvPicPr>
+            <a:picLocks noChangeAspect="1" noChangeArrowheads="1"/>
+          </p:cNvPicPr>
+          <p:nvPr/>
+        </p:nvPicPr>
+        <p:blipFill>
+          <a:blip r:embed="rId2">
+            <a:extLst>
+              <a:ext uri="{28A0092B-C50C-407E-A947-70E740481C1C}">
+                <a14:useLocalDpi xmlns:a14="http://schemas.microsoft.com/office/drawing/2010/main" val="0"/>
+              </a:ext>
+            </a:extLst>
+          </a:blip>
+          <a:srcRect/>
+          <a:stretch>
+            <a:fillRect/>
+          </a:stretch>
+        </p:blipFill>
+        <p:spPr bwMode="auto">
+          <a:xfrm>
+            <a:off x="8637972" y="3732613"/>
+            <a:ext cx="2335505" cy="2335505"/>
+          </a:xfrm>
+          <a:prstGeom prst="rect">
+            <a:avLst/>
+          </a:prstGeom>
+          <a:noFill/>
+          <a:extLst>
+            <a:ext uri="{909E8E84-426E-40DD-AFC4-6F175D3DCCD1}">
+              <a14:hiddenFill xmlns:a14="http://schemas.microsoft.com/office/drawing/2010/main">
+                <a:solidFill>
+                  <a:srgbClr val="FFFFFF"/>
+                </a:solidFill>
+              </a14:hiddenFill>
+            </a:ext>
+          </a:extLst>
+        </p:spPr>
+      </p:pic>
+    </p:spTree>
+    <p:extLst>
+      <p:ext uri="{BB962C8B-B14F-4D97-AF65-F5344CB8AC3E}">
+        <p14:creationId xmlns:p14="http://schemas.microsoft.com/office/powerpoint/2010/main" val="1874453720"/>
+      </p:ext>
+    </p:extLst>
+  </p:cSld>
+  <p:clrMapOvr>
+    <a:masterClrMapping/>
+  </p:clrMapOvr>
+</p:sld>
+</file>
+
+<file path=ppt/slides/slide7.xml><?xml version="1.0" encoding="utf-8"?>
 <p:sld xmlns:a="http://schemas.openxmlformats.org/drawingml/2006/main" xmlns:r="http://schemas.openxmlformats.org/officeDocument/2006/relationships" xmlns:p="http://schemas.openxmlformats.org/presentationml/2006/main">
   <p:cSld>
     <p:spTree>
@@ -3604,7 +4262,7 @@
 </p:sld>
 </file>
 
-<file path=ppt/slides/slide11.xml><?xml version="1.0" encoding="utf-8"?>
+<file path=ppt/slides/slide8.xml><?xml version="1.0" encoding="utf-8"?>
 <p:sld xmlns:a="http://schemas.openxmlformats.org/drawingml/2006/main" xmlns:r="http://schemas.openxmlformats.org/officeDocument/2006/relationships" xmlns:p="http://schemas.openxmlformats.org/presentationml/2006/main">
   <p:cSld>
     <p:spTree>
@@ -3739,2746 +4397,6 @@
 </p:sld>
 </file>
 
-<file path=ppt/slides/slide12.xml><?xml version="1.0" encoding="utf-8"?>
-<p:sld xmlns:a="http://schemas.openxmlformats.org/drawingml/2006/main" xmlns:r="http://schemas.openxmlformats.org/officeDocument/2006/relationships" xmlns:p="http://schemas.openxmlformats.org/presentationml/2006/main">
-  <p:cSld>
-    <p:spTree>
-      <p:nvGrpSpPr>
-        <p:cNvPr id="1" name=""/>
-        <p:cNvGrpSpPr/>
-        <p:nvPr/>
-      </p:nvGrpSpPr>
-      <p:grpSpPr>
-        <a:xfrm>
-          <a:off x="0" y="0"/>
-          <a:ext cx="0" cy="0"/>
-          <a:chOff x="0" y="0"/>
-          <a:chExt cx="0" cy="0"/>
-        </a:xfrm>
-      </p:grpSpPr>
-      <p:sp>
-        <p:nvSpPr>
-          <p:cNvPr id="2" name="Title 1"/>
-          <p:cNvSpPr>
-            <a:spLocks noGrp="1"/>
-          </p:cNvSpPr>
-          <p:nvPr>
-            <p:ph type="title"/>
-          </p:nvPr>
-        </p:nvSpPr>
-        <p:spPr/>
-        <p:txBody>
-          <a:bodyPr/>
-          <a:lstStyle/>
-          <a:p>
-            <a:r>
-              <a:rPr lang="en-US" dirty="0"/>
-              <a:t>Why not ASP.NET Core?</a:t>
-            </a:r>
-          </a:p>
-        </p:txBody>
-      </p:sp>
-      <p:sp>
-        <p:nvSpPr>
-          <p:cNvPr id="3" name="Content Placeholder 2"/>
-          <p:cNvSpPr>
-            <a:spLocks noGrp="1"/>
-          </p:cNvSpPr>
-          <p:nvPr>
-            <p:ph idx="1"/>
-          </p:nvPr>
-        </p:nvSpPr>
-        <p:spPr/>
-        <p:txBody>
-          <a:bodyPr/>
-          <a:lstStyle/>
-          <a:p>
-            <a:r>
-              <a:rPr lang="en-US" dirty="0"/>
-              <a:t>APIs still in flux</a:t>
-            </a:r>
-          </a:p>
-          <a:p>
-            <a:r>
-              <a:rPr lang="en-US" strike="sngStrike" dirty="0"/>
-              <a:t>Some of my material has been outdated already!</a:t>
-            </a:r>
-          </a:p>
-          <a:p>
-            <a:r>
-              <a:rPr lang="en-US" dirty="0"/>
-              <a:t>Not RTM</a:t>
-            </a:r>
-          </a:p>
-        </p:txBody>
-      </p:sp>
-      <p:pic>
-        <p:nvPicPr>
-          <p:cNvPr id="4" name="Picture 2" descr="http://academy.scards.com/wp-content/uploads/2013/12/ASP-NET-LOGO-300x300.png"/>
-          <p:cNvPicPr>
-            <a:picLocks noChangeAspect="1" noChangeArrowheads="1"/>
-          </p:cNvPicPr>
-          <p:nvPr/>
-        </p:nvPicPr>
-        <p:blipFill>
-          <a:blip r:embed="rId2">
-            <a:extLst>
-              <a:ext uri="{28A0092B-C50C-407E-A947-70E740481C1C}">
-                <a14:useLocalDpi xmlns:a14="http://schemas.microsoft.com/office/drawing/2010/main" val="0"/>
-              </a:ext>
-            </a:extLst>
-          </a:blip>
-          <a:srcRect/>
-          <a:stretch>
-            <a:fillRect/>
-          </a:stretch>
-        </p:blipFill>
-        <p:spPr bwMode="auto">
-          <a:xfrm>
-            <a:off x="7717900" y="3256384"/>
-            <a:ext cx="2857500" cy="2857500"/>
-          </a:xfrm>
-          <a:prstGeom prst="rect">
-            <a:avLst/>
-          </a:prstGeom>
-          <a:noFill/>
-          <a:extLst>
-            <a:ext uri="{909E8E84-426E-40DD-AFC4-6F175D3DCCD1}">
-              <a14:hiddenFill xmlns:a14="http://schemas.microsoft.com/office/drawing/2010/main">
-                <a:solidFill>
-                  <a:srgbClr val="FFFFFF"/>
-                </a:solidFill>
-              </a14:hiddenFill>
-            </a:ext>
-          </a:extLst>
-        </p:spPr>
-      </p:pic>
-    </p:spTree>
-    <p:extLst>
-      <p:ext uri="{BB962C8B-B14F-4D97-AF65-F5344CB8AC3E}">
-        <p14:creationId xmlns:p14="http://schemas.microsoft.com/office/powerpoint/2010/main" val="3193212356"/>
-      </p:ext>
-    </p:extLst>
-  </p:cSld>
-  <p:clrMapOvr>
-    <a:masterClrMapping/>
-  </p:clrMapOvr>
-</p:sld>
-</file>
-
-<file path=ppt/slides/slide13.xml><?xml version="1.0" encoding="utf-8"?>
-<p:sld xmlns:a="http://schemas.openxmlformats.org/drawingml/2006/main" xmlns:r="http://schemas.openxmlformats.org/officeDocument/2006/relationships" xmlns:p="http://schemas.openxmlformats.org/presentationml/2006/main">
-  <p:cSld>
-    <p:spTree>
-      <p:nvGrpSpPr>
-        <p:cNvPr id="1" name=""/>
-        <p:cNvGrpSpPr/>
-        <p:nvPr/>
-      </p:nvGrpSpPr>
-      <p:grpSpPr>
-        <a:xfrm>
-          <a:off x="0" y="0"/>
-          <a:ext cx="0" cy="0"/>
-          <a:chOff x="0" y="0"/>
-          <a:chExt cx="0" cy="0"/>
-        </a:xfrm>
-      </p:grpSpPr>
-      <p:sp>
-        <p:nvSpPr>
-          <p:cNvPr id="2" name="Title 1"/>
-          <p:cNvSpPr>
-            <a:spLocks noGrp="1"/>
-          </p:cNvSpPr>
-          <p:nvPr>
-            <p:ph type="title"/>
-          </p:nvPr>
-        </p:nvSpPr>
-        <p:spPr/>
-        <p:txBody>
-          <a:bodyPr/>
-          <a:lstStyle/>
-          <a:p>
-            <a:r>
-              <a:rPr lang="en-US" dirty="0"/>
-              <a:t>Thankfully…</a:t>
-            </a:r>
-          </a:p>
-        </p:txBody>
-      </p:sp>
-      <p:sp>
-        <p:nvSpPr>
-          <p:cNvPr id="3" name="Content Placeholder 2"/>
-          <p:cNvSpPr>
-            <a:spLocks noGrp="1"/>
-          </p:cNvSpPr>
-          <p:nvPr>
-            <p:ph idx="1"/>
-          </p:nvPr>
-        </p:nvSpPr>
-        <p:spPr/>
-        <p:txBody>
-          <a:bodyPr/>
-          <a:lstStyle/>
-          <a:p>
-            <a:r>
-              <a:rPr lang="en-US" dirty="0"/>
-              <a:t>Everything I’m showing you today is mostly Angular 2</a:t>
-            </a:r>
-          </a:p>
-          <a:p>
-            <a:r>
-              <a:rPr lang="en-US" dirty="0"/>
-              <a:t>You can use ASP.NET 4.6 with Angular 2 – and I do!</a:t>
-            </a:r>
-          </a:p>
-        </p:txBody>
-      </p:sp>
-    </p:spTree>
-    <p:extLst>
-      <p:ext uri="{BB962C8B-B14F-4D97-AF65-F5344CB8AC3E}">
-        <p14:creationId xmlns:p14="http://schemas.microsoft.com/office/powerpoint/2010/main" val="3212732658"/>
-      </p:ext>
-    </p:extLst>
-  </p:cSld>
-  <p:clrMapOvr>
-    <a:masterClrMapping/>
-  </p:clrMapOvr>
-</p:sld>
-</file>
-
-<file path=ppt/slides/slide2.xml><?xml version="1.0" encoding="utf-8"?>
-<p:sld xmlns:a="http://schemas.openxmlformats.org/drawingml/2006/main" xmlns:r="http://schemas.openxmlformats.org/officeDocument/2006/relationships" xmlns:p="http://schemas.openxmlformats.org/presentationml/2006/main">
-  <p:cSld>
-    <p:spTree>
-      <p:nvGrpSpPr>
-        <p:cNvPr id="1" name=""/>
-        <p:cNvGrpSpPr/>
-        <p:nvPr/>
-      </p:nvGrpSpPr>
-      <p:grpSpPr>
-        <a:xfrm>
-          <a:off x="0" y="0"/>
-          <a:ext cx="0" cy="0"/>
-          <a:chOff x="0" y="0"/>
-          <a:chExt cx="0" cy="0"/>
-        </a:xfrm>
-      </p:grpSpPr>
-      <p:graphicFrame>
-        <p:nvGraphicFramePr>
-          <p:cNvPr id="5" name="Table 4"/>
-          <p:cNvGraphicFramePr>
-            <a:graphicFrameLocks noGrp="1"/>
-          </p:cNvGraphicFramePr>
-          <p:nvPr>
-            <p:extLst/>
-          </p:nvPr>
-        </p:nvGraphicFramePr>
-        <p:xfrm>
-          <a:off x="1609746" y="76339"/>
-          <a:ext cx="8956888" cy="1723808"/>
-        </p:xfrm>
-        <a:graphic>
-          <a:graphicData uri="http://schemas.openxmlformats.org/drawingml/2006/table">
-            <a:tbl>
-              <a:tblPr firstRow="1" bandRow="1">
-                <a:tableStyleId>{5C22544A-7EE6-4342-B048-85BDC9FD1C3A}</a:tableStyleId>
-              </a:tblPr>
-              <a:tblGrid>
-                <a:gridCol w="8956888">
-                  <a:extLst>
-                    <a:ext uri="{9D8B030D-6E8A-4147-A177-3AD203B41FA5}">
-                      <a16:colId xmlns:a16="http://schemas.microsoft.com/office/drawing/2014/main" val="20000"/>
-                    </a:ext>
-                  </a:extLst>
-                </a:gridCol>
-              </a:tblGrid>
-              <a:tr h="1723808">
-                <a:tc>
-                  <a:txBody>
-                    <a:bodyPr/>
-                    <a:lstStyle/>
-                    <a:p>
-                      <a:pPr algn="l"/>
-                      <a:r>
-                        <a:rPr lang="en-US" sz="2400" u="sng" dirty="0">
-                          <a:solidFill>
-                            <a:srgbClr val="106A9A"/>
-                          </a:solidFill>
-                        </a:rPr>
-                        <a:t>TITANIUM SPONSORS</a:t>
-                      </a:r>
-                    </a:p>
-                  </a:txBody>
-                  <a:tcPr>
-                    <a:lnL w="12700" cap="flat" cmpd="sng" algn="ctr">
-                      <a:solidFill>
-                        <a:scrgbClr r="0" g="0" b="0"/>
-                      </a:solidFill>
-                      <a:prstDash val="solid"/>
-                      <a:round/>
-                      <a:headEnd type="none" w="med" len="med"/>
-                      <a:tailEnd type="none" w="med" len="med"/>
-                    </a:lnL>
-                    <a:lnR w="12700" cap="flat" cmpd="sng" algn="ctr">
-                      <a:solidFill>
-                        <a:scrgbClr r="0" g="0" b="0"/>
-                      </a:solidFill>
-                      <a:prstDash val="solid"/>
-                      <a:round/>
-                      <a:headEnd type="none" w="med" len="med"/>
-                      <a:tailEnd type="none" w="med" len="med"/>
-                    </a:lnR>
-                    <a:lnT w="12700" cap="flat" cmpd="sng" algn="ctr">
-                      <a:solidFill>
-                        <a:scrgbClr r="0" g="0" b="0"/>
-                      </a:solidFill>
-                      <a:prstDash val="solid"/>
-                      <a:round/>
-                      <a:headEnd type="none" w="med" len="med"/>
-                      <a:tailEnd type="none" w="med" len="med"/>
-                    </a:lnT>
-                    <a:lnB w="12700" cap="flat" cmpd="sng" algn="ctr">
-                      <a:solidFill>
-                        <a:scrgbClr r="0" g="0" b="0"/>
-                      </a:solidFill>
-                      <a:prstDash val="solid"/>
-                      <a:round/>
-                      <a:headEnd type="none" w="med" len="med"/>
-                      <a:tailEnd type="none" w="med" len="med"/>
-                    </a:lnB>
-                    <a:solidFill>
-                      <a:schemeClr val="bg1"/>
-                    </a:solidFill>
-                  </a:tcPr>
-                </a:tc>
-                <a:extLst>
-                  <a:ext uri="{0D108BD9-81ED-4DB2-BD59-A6C34878D82A}">
-                    <a16:rowId xmlns:a16="http://schemas.microsoft.com/office/drawing/2014/main" val="10000"/>
-                  </a:ext>
-                </a:extLst>
-              </a:tr>
-            </a:tbl>
-          </a:graphicData>
-        </a:graphic>
-      </p:graphicFrame>
-      <p:pic>
-        <p:nvPicPr>
-          <p:cNvPr id="8" name="Picture 7" descr="Paige Technologies.png"/>
-          <p:cNvPicPr>
-            <a:picLocks noChangeAspect="1"/>
-          </p:cNvPicPr>
-          <p:nvPr/>
-        </p:nvPicPr>
-        <p:blipFill>
-          <a:blip r:embed="rId3">
-            <a:extLst>
-              <a:ext uri="{28A0092B-C50C-407E-A947-70E740481C1C}">
-                <a14:useLocalDpi xmlns:a14="http://schemas.microsoft.com/office/drawing/2010/main"/>
-              </a:ext>
-            </a:extLst>
-          </a:blip>
-          <a:stretch>
-            <a:fillRect/>
-          </a:stretch>
-        </p:blipFill>
-        <p:spPr>
-          <a:xfrm>
-            <a:off x="4278570" y="422618"/>
-            <a:ext cx="2251008" cy="1282506"/>
-          </a:xfrm>
-          <a:prstGeom prst="rect">
-            <a:avLst/>
-          </a:prstGeom>
-        </p:spPr>
-      </p:pic>
-      <p:graphicFrame>
-        <p:nvGraphicFramePr>
-          <p:cNvPr id="10" name="Table 9"/>
-          <p:cNvGraphicFramePr>
-            <a:graphicFrameLocks noGrp="1"/>
-          </p:cNvGraphicFramePr>
-          <p:nvPr>
-            <p:extLst/>
-          </p:nvPr>
-        </p:nvGraphicFramePr>
-        <p:xfrm>
-          <a:off x="1601504" y="1911927"/>
-          <a:ext cx="8956888" cy="1813414"/>
-        </p:xfrm>
-        <a:graphic>
-          <a:graphicData uri="http://schemas.openxmlformats.org/drawingml/2006/table">
-            <a:tbl>
-              <a:tblPr firstRow="1" bandRow="1">
-                <a:tableStyleId>{5C22544A-7EE6-4342-B048-85BDC9FD1C3A}</a:tableStyleId>
-              </a:tblPr>
-              <a:tblGrid>
-                <a:gridCol w="8956888">
-                  <a:extLst>
-                    <a:ext uri="{9D8B030D-6E8A-4147-A177-3AD203B41FA5}">
-                      <a16:colId xmlns:a16="http://schemas.microsoft.com/office/drawing/2014/main" val="20000"/>
-                    </a:ext>
-                  </a:extLst>
-                </a:gridCol>
-              </a:tblGrid>
-              <a:tr h="1813414">
-                <a:tc>
-                  <a:txBody>
-                    <a:bodyPr/>
-                    <a:lstStyle/>
-                    <a:p>
-                      <a:r>
-                        <a:rPr lang="en-US" sz="2000" u="sng" dirty="0">
-                          <a:solidFill>
-                            <a:srgbClr val="106A9A"/>
-                          </a:solidFill>
-                        </a:rPr>
-                        <a:t>Platinum</a:t>
-                      </a:r>
-                      <a:r>
-                        <a:rPr lang="en-US" sz="2000" u="sng" baseline="0" dirty="0">
-                          <a:solidFill>
-                            <a:srgbClr val="106A9A"/>
-                          </a:solidFill>
-                        </a:rPr>
-                        <a:t> Sponsors</a:t>
-                      </a:r>
-                      <a:endParaRPr lang="en-US" sz="2000" u="sng" dirty="0">
-                        <a:solidFill>
-                          <a:srgbClr val="106A9A"/>
-                        </a:solidFill>
-                      </a:endParaRPr>
-                    </a:p>
-                  </a:txBody>
-                  <a:tcPr>
-                    <a:lnL w="12700" cap="flat" cmpd="sng" algn="ctr">
-                      <a:solidFill>
-                        <a:scrgbClr r="0" g="0" b="0"/>
-                      </a:solidFill>
-                      <a:prstDash val="solid"/>
-                      <a:round/>
-                      <a:headEnd type="none" w="med" len="med"/>
-                      <a:tailEnd type="none" w="med" len="med"/>
-                    </a:lnL>
-                    <a:lnR w="12700" cap="flat" cmpd="sng" algn="ctr">
-                      <a:solidFill>
-                        <a:scrgbClr r="0" g="0" b="0"/>
-                      </a:solidFill>
-                      <a:prstDash val="solid"/>
-                      <a:round/>
-                      <a:headEnd type="none" w="med" len="med"/>
-                      <a:tailEnd type="none" w="med" len="med"/>
-                    </a:lnR>
-                    <a:lnT w="12700" cap="flat" cmpd="sng" algn="ctr">
-                      <a:solidFill>
-                        <a:scrgbClr r="0" g="0" b="0"/>
-                      </a:solidFill>
-                      <a:prstDash val="solid"/>
-                      <a:round/>
-                      <a:headEnd type="none" w="med" len="med"/>
-                      <a:tailEnd type="none" w="med" len="med"/>
-                    </a:lnT>
-                    <a:lnB w="12700" cap="flat" cmpd="sng" algn="ctr">
-                      <a:solidFill>
-                        <a:scrgbClr r="0" g="0" b="0"/>
-                      </a:solidFill>
-                      <a:prstDash val="solid"/>
-                      <a:round/>
-                      <a:headEnd type="none" w="med" len="med"/>
-                      <a:tailEnd type="none" w="med" len="med"/>
-                    </a:lnB>
-                    <a:solidFill>
-                      <a:srgbClr val="FFFFFF"/>
-                    </a:solidFill>
-                  </a:tcPr>
-                </a:tc>
-                <a:extLst>
-                  <a:ext uri="{0D108BD9-81ED-4DB2-BD59-A6C34878D82A}">
-                    <a16:rowId xmlns:a16="http://schemas.microsoft.com/office/drawing/2014/main" val="10000"/>
-                  </a:ext>
-                </a:extLst>
-              </a:tr>
-            </a:tbl>
-          </a:graphicData>
-        </a:graphic>
-      </p:graphicFrame>
-      <p:pic>
-        <p:nvPicPr>
-          <p:cNvPr id="11" name="Picture 10" descr="Adaptive Solutions Group.png"/>
-          <p:cNvPicPr>
-            <a:picLocks noChangeAspect="1"/>
-          </p:cNvPicPr>
-          <p:nvPr/>
-        </p:nvPicPr>
-        <p:blipFill>
-          <a:blip r:embed="rId4">
-            <a:extLst>
-              <a:ext uri="{28A0092B-C50C-407E-A947-70E740481C1C}">
-                <a14:useLocalDpi xmlns:a14="http://schemas.microsoft.com/office/drawing/2010/main"/>
-              </a:ext>
-            </a:extLst>
-          </a:blip>
-          <a:stretch>
-            <a:fillRect/>
-          </a:stretch>
-        </p:blipFill>
-        <p:spPr>
-          <a:xfrm>
-            <a:off x="6562087" y="79281"/>
-            <a:ext cx="3932916" cy="773475"/>
-          </a:xfrm>
-          <a:prstGeom prst="rect">
-            <a:avLst/>
-          </a:prstGeom>
-        </p:spPr>
-      </p:pic>
-      <p:graphicFrame>
-        <p:nvGraphicFramePr>
-          <p:cNvPr id="21" name="Table 20"/>
-          <p:cNvGraphicFramePr>
-            <a:graphicFrameLocks noGrp="1"/>
-          </p:cNvGraphicFramePr>
-          <p:nvPr>
-            <p:extLst/>
-          </p:nvPr>
-        </p:nvGraphicFramePr>
-        <p:xfrm>
-          <a:off x="1609746" y="3852862"/>
-          <a:ext cx="8956888" cy="2903538"/>
-        </p:xfrm>
-        <a:graphic>
-          <a:graphicData uri="http://schemas.openxmlformats.org/drawingml/2006/table">
-            <a:tbl>
-              <a:tblPr firstRow="1" bandRow="1">
-                <a:tableStyleId>{5C22544A-7EE6-4342-B048-85BDC9FD1C3A}</a:tableStyleId>
-              </a:tblPr>
-              <a:tblGrid>
-                <a:gridCol w="8956888">
-                  <a:extLst>
-                    <a:ext uri="{9D8B030D-6E8A-4147-A177-3AD203B41FA5}">
-                      <a16:colId xmlns:a16="http://schemas.microsoft.com/office/drawing/2014/main" val="20000"/>
-                    </a:ext>
-                  </a:extLst>
-                </a:gridCol>
-              </a:tblGrid>
-              <a:tr h="2903538">
-                <a:tc>
-                  <a:txBody>
-                    <a:bodyPr/>
-                    <a:lstStyle/>
-                    <a:p>
-                      <a:r>
-                        <a:rPr lang="en-US" u="sng" baseline="0" dirty="0">
-                          <a:solidFill>
-                            <a:srgbClr val="106A9A"/>
-                          </a:solidFill>
-                        </a:rPr>
-                        <a:t>Gold Sponsors</a:t>
-                      </a:r>
-                    </a:p>
-                  </a:txBody>
-                  <a:tcPr>
-                    <a:lnL w="12700" cap="flat" cmpd="sng" algn="ctr">
-                      <a:solidFill>
-                        <a:scrgbClr r="0" g="0" b="0"/>
-                      </a:solidFill>
-                      <a:prstDash val="solid"/>
-                      <a:round/>
-                      <a:headEnd type="none" w="med" len="med"/>
-                      <a:tailEnd type="none" w="med" len="med"/>
-                    </a:lnL>
-                    <a:lnR w="12700" cap="flat" cmpd="sng" algn="ctr">
-                      <a:solidFill>
-                        <a:scrgbClr r="0" g="0" b="0"/>
-                      </a:solidFill>
-                      <a:prstDash val="solid"/>
-                      <a:round/>
-                      <a:headEnd type="none" w="med" len="med"/>
-                      <a:tailEnd type="none" w="med" len="med"/>
-                    </a:lnR>
-                    <a:lnT w="12700" cap="flat" cmpd="sng" algn="ctr">
-                      <a:solidFill>
-                        <a:scrgbClr r="0" g="0" b="0"/>
-                      </a:solidFill>
-                      <a:prstDash val="solid"/>
-                      <a:round/>
-                      <a:headEnd type="none" w="med" len="med"/>
-                      <a:tailEnd type="none" w="med" len="med"/>
-                    </a:lnT>
-                    <a:lnB w="12700" cap="flat" cmpd="sng" algn="ctr">
-                      <a:solidFill>
-                        <a:scrgbClr r="0" g="0" b="0"/>
-                      </a:solidFill>
-                      <a:prstDash val="solid"/>
-                      <a:round/>
-                      <a:headEnd type="none" w="med" len="med"/>
-                      <a:tailEnd type="none" w="med" len="med"/>
-                    </a:lnB>
-                    <a:solidFill>
-                      <a:srgbClr val="FFFFFF"/>
-                    </a:solidFill>
-                  </a:tcPr>
-                </a:tc>
-                <a:extLst>
-                  <a:ext uri="{0D108BD9-81ED-4DB2-BD59-A6C34878D82A}">
-                    <a16:rowId xmlns:a16="http://schemas.microsoft.com/office/drawing/2014/main" val="10000"/>
-                  </a:ext>
-                </a:extLst>
-              </a:tr>
-            </a:tbl>
-          </a:graphicData>
-        </a:graphic>
-      </p:graphicFrame>
-      <p:pic>
-        <p:nvPicPr>
-          <p:cNvPr id="23" name="Picture 22" descr="Bradford and Galt.png"/>
-          <p:cNvPicPr>
-            <a:picLocks noChangeAspect="1"/>
-          </p:cNvPicPr>
-          <p:nvPr/>
-        </p:nvPicPr>
-        <p:blipFill>
-          <a:blip r:embed="rId5" cstate="hqprint">
-            <a:extLst>
-              <a:ext uri="{28A0092B-C50C-407E-A947-70E740481C1C}">
-                <a14:useLocalDpi xmlns:a14="http://schemas.microsoft.com/office/drawing/2010/main"/>
-              </a:ext>
-            </a:extLst>
-          </a:blip>
-          <a:stretch>
-            <a:fillRect/>
-          </a:stretch>
-        </p:blipFill>
-        <p:spPr>
-          <a:xfrm>
-            <a:off x="8374339" y="3944782"/>
-            <a:ext cx="794074" cy="544508"/>
-          </a:xfrm>
-          <a:prstGeom prst="rect">
-            <a:avLst/>
-          </a:prstGeom>
-        </p:spPr>
-      </p:pic>
-      <p:pic>
-        <p:nvPicPr>
-          <p:cNvPr id="24" name="Picture 23" descr="Centriq Training.png"/>
-          <p:cNvPicPr>
-            <a:picLocks noChangeAspect="1"/>
-          </p:cNvPicPr>
-          <p:nvPr/>
-        </p:nvPicPr>
-        <p:blipFill>
-          <a:blip r:embed="rId6">
-            <a:extLst>
-              <a:ext uri="{28A0092B-C50C-407E-A947-70E740481C1C}">
-                <a14:useLocalDpi xmlns:a14="http://schemas.microsoft.com/office/drawing/2010/main"/>
-              </a:ext>
-            </a:extLst>
-          </a:blip>
-          <a:stretch>
-            <a:fillRect/>
-          </a:stretch>
-        </p:blipFill>
-        <p:spPr>
-          <a:xfrm>
-            <a:off x="3316274" y="6155678"/>
-            <a:ext cx="1273457" cy="539097"/>
-          </a:xfrm>
-          <a:prstGeom prst="rect">
-            <a:avLst/>
-          </a:prstGeom>
-        </p:spPr>
-      </p:pic>
-      <p:pic>
-        <p:nvPicPr>
-          <p:cNvPr id="25" name="Picture 24" descr="Cerner.png"/>
-          <p:cNvPicPr>
-            <a:picLocks noChangeAspect="1"/>
-          </p:cNvPicPr>
-          <p:nvPr/>
-        </p:nvPicPr>
-        <p:blipFill>
-          <a:blip r:embed="rId7">
-            <a:extLst>
-              <a:ext uri="{28A0092B-C50C-407E-A947-70E740481C1C}">
-                <a14:useLocalDpi xmlns:a14="http://schemas.microsoft.com/office/drawing/2010/main"/>
-              </a:ext>
-            </a:extLst>
-          </a:blip>
-          <a:stretch>
-            <a:fillRect/>
-          </a:stretch>
-        </p:blipFill>
-        <p:spPr>
-          <a:xfrm>
-            <a:off x="6066464" y="4092020"/>
-            <a:ext cx="1167630" cy="316929"/>
-          </a:xfrm>
-          <a:prstGeom prst="rect">
-            <a:avLst/>
-          </a:prstGeom>
-        </p:spPr>
-      </p:pic>
-      <p:pic>
-        <p:nvPicPr>
-          <p:cNvPr id="28" name="Picture 27" descr="DSI.png"/>
-          <p:cNvPicPr>
-            <a:picLocks noChangeAspect="1"/>
-          </p:cNvPicPr>
-          <p:nvPr/>
-        </p:nvPicPr>
-        <p:blipFill>
-          <a:blip r:embed="rId8" cstate="hqprint">
-            <a:extLst>
-              <a:ext uri="{28A0092B-C50C-407E-A947-70E740481C1C}">
-                <a14:useLocalDpi xmlns:a14="http://schemas.microsoft.com/office/drawing/2010/main"/>
-              </a:ext>
-            </a:extLst>
-          </a:blip>
-          <a:stretch>
-            <a:fillRect/>
-          </a:stretch>
-        </p:blipFill>
-        <p:spPr>
-          <a:xfrm>
-            <a:off x="1733032" y="4327012"/>
-            <a:ext cx="869920" cy="282784"/>
-          </a:xfrm>
-          <a:prstGeom prst="rect">
-            <a:avLst/>
-          </a:prstGeom>
-        </p:spPr>
-      </p:pic>
-      <p:pic>
-        <p:nvPicPr>
-          <p:cNvPr id="29" name="Picture 28" descr="Garmin.png"/>
-          <p:cNvPicPr>
-            <a:picLocks noChangeAspect="1"/>
-          </p:cNvPicPr>
-          <p:nvPr/>
-        </p:nvPicPr>
-        <p:blipFill>
-          <a:blip r:embed="rId9">
-            <a:extLst>
-              <a:ext uri="{28A0092B-C50C-407E-A947-70E740481C1C}">
-                <a14:useLocalDpi xmlns:a14="http://schemas.microsoft.com/office/drawing/2010/main"/>
-              </a:ext>
-            </a:extLst>
-          </a:blip>
-          <a:stretch>
-            <a:fillRect/>
-          </a:stretch>
-        </p:blipFill>
-        <p:spPr>
-          <a:xfrm>
-            <a:off x="9292724" y="3929454"/>
-            <a:ext cx="1221914" cy="331662"/>
-          </a:xfrm>
-          <a:prstGeom prst="rect">
-            <a:avLst/>
-          </a:prstGeom>
-        </p:spPr>
-      </p:pic>
-      <p:pic>
-        <p:nvPicPr>
-          <p:cNvPr id="31" name="Picture 30" descr="Keyhole Software.png"/>
-          <p:cNvPicPr>
-            <a:picLocks noChangeAspect="1"/>
-          </p:cNvPicPr>
-          <p:nvPr/>
-        </p:nvPicPr>
-        <p:blipFill>
-          <a:blip r:embed="rId10">
-            <a:extLst>
-              <a:ext uri="{28A0092B-C50C-407E-A947-70E740481C1C}">
-                <a14:useLocalDpi xmlns:a14="http://schemas.microsoft.com/office/drawing/2010/main"/>
-              </a:ext>
-            </a:extLst>
-          </a:blip>
-          <a:stretch>
-            <a:fillRect/>
-          </a:stretch>
-        </p:blipFill>
-        <p:spPr>
-          <a:xfrm>
-            <a:off x="4648492" y="3965281"/>
-            <a:ext cx="1285045" cy="465065"/>
-          </a:xfrm>
-          <a:prstGeom prst="rect">
-            <a:avLst/>
-          </a:prstGeom>
-        </p:spPr>
-      </p:pic>
-      <p:pic>
-        <p:nvPicPr>
-          <p:cNvPr id="32" name="Picture 31" descr="KU Edwards Campus.png"/>
-          <p:cNvPicPr>
-            <a:picLocks noChangeAspect="1"/>
-          </p:cNvPicPr>
-          <p:nvPr/>
-        </p:nvPicPr>
-        <p:blipFill>
-          <a:blip r:embed="rId11">
-            <a:extLst>
-              <a:ext uri="{28A0092B-C50C-407E-A947-70E740481C1C}">
-                <a14:useLocalDpi xmlns:a14="http://schemas.microsoft.com/office/drawing/2010/main"/>
-              </a:ext>
-            </a:extLst>
-          </a:blip>
-          <a:stretch>
-            <a:fillRect/>
-          </a:stretch>
-        </p:blipFill>
-        <p:spPr>
-          <a:xfrm>
-            <a:off x="9076423" y="1931731"/>
-            <a:ext cx="1468114" cy="1174490"/>
-          </a:xfrm>
-          <a:prstGeom prst="rect">
-            <a:avLst/>
-          </a:prstGeom>
-        </p:spPr>
-      </p:pic>
-      <p:pic>
-        <p:nvPicPr>
-          <p:cNvPr id="33" name="Picture 32" descr="LRS Consulting Services.png"/>
-          <p:cNvPicPr>
-            <a:picLocks noChangeAspect="1"/>
-          </p:cNvPicPr>
-          <p:nvPr/>
-        </p:nvPicPr>
-        <p:blipFill>
-          <a:blip r:embed="rId12">
-            <a:extLst>
-              <a:ext uri="{28A0092B-C50C-407E-A947-70E740481C1C}">
-                <a14:useLocalDpi xmlns:a14="http://schemas.microsoft.com/office/drawing/2010/main"/>
-              </a:ext>
-            </a:extLst>
-          </a:blip>
-          <a:stretch>
-            <a:fillRect/>
-          </a:stretch>
-        </p:blipFill>
-        <p:spPr>
-          <a:xfrm>
-            <a:off x="2460805" y="4785403"/>
-            <a:ext cx="1349747" cy="449915"/>
-          </a:xfrm>
-          <a:prstGeom prst="rect">
-            <a:avLst/>
-          </a:prstGeom>
-        </p:spPr>
-      </p:pic>
-      <p:pic>
-        <p:nvPicPr>
-          <p:cNvPr id="37" name="Picture 36" descr="Oakwood Systems.png"/>
-          <p:cNvPicPr>
-            <a:picLocks noChangeAspect="1"/>
-          </p:cNvPicPr>
-          <p:nvPr/>
-        </p:nvPicPr>
-        <p:blipFill>
-          <a:blip r:embed="rId13">
-            <a:extLst>
-              <a:ext uri="{28A0092B-C50C-407E-A947-70E740481C1C}">
-                <a14:useLocalDpi xmlns:a14="http://schemas.microsoft.com/office/drawing/2010/main"/>
-              </a:ext>
-            </a:extLst>
-          </a:blip>
-          <a:stretch>
-            <a:fillRect/>
-          </a:stretch>
-        </p:blipFill>
-        <p:spPr>
-          <a:xfrm>
-            <a:off x="3133625" y="3903082"/>
-            <a:ext cx="1514867" cy="380881"/>
-          </a:xfrm>
-          <a:prstGeom prst="rect">
-            <a:avLst/>
-          </a:prstGeom>
-        </p:spPr>
-      </p:pic>
-      <p:pic>
-        <p:nvPicPr>
-          <p:cNvPr id="39" name="Picture 38" descr="Stackify.png"/>
-          <p:cNvPicPr>
-            <a:picLocks noChangeAspect="1"/>
-          </p:cNvPicPr>
-          <p:nvPr/>
-        </p:nvPicPr>
-        <p:blipFill>
-          <a:blip r:embed="rId14">
-            <a:extLst>
-              <a:ext uri="{28A0092B-C50C-407E-A947-70E740481C1C}">
-                <a14:useLocalDpi xmlns:a14="http://schemas.microsoft.com/office/drawing/2010/main"/>
-              </a:ext>
-            </a:extLst>
-          </a:blip>
-          <a:stretch>
-            <a:fillRect/>
-          </a:stretch>
-        </p:blipFill>
-        <p:spPr>
-          <a:xfrm>
-            <a:off x="5049241" y="3085364"/>
-            <a:ext cx="1882973" cy="629450"/>
-          </a:xfrm>
-          <a:prstGeom prst="rect">
-            <a:avLst/>
-          </a:prstGeom>
-        </p:spPr>
-      </p:pic>
-      <p:pic>
-        <p:nvPicPr>
-          <p:cNvPr id="42" name="Picture 41" descr="UnitedLex.png"/>
-          <p:cNvPicPr>
-            <a:picLocks noChangeAspect="1"/>
-          </p:cNvPicPr>
-          <p:nvPr/>
-        </p:nvPicPr>
-        <p:blipFill>
-          <a:blip r:embed="rId15">
-            <a:extLst>
-              <a:ext uri="{28A0092B-C50C-407E-A947-70E740481C1C}">
-                <a14:useLocalDpi xmlns:a14="http://schemas.microsoft.com/office/drawing/2010/main"/>
-              </a:ext>
-            </a:extLst>
-          </a:blip>
-          <a:stretch>
-            <a:fillRect/>
-          </a:stretch>
-        </p:blipFill>
-        <p:spPr>
-          <a:xfrm>
-            <a:off x="9069069" y="5089641"/>
-            <a:ext cx="1314797" cy="323064"/>
-          </a:xfrm>
-          <a:prstGeom prst="rect">
-            <a:avLst/>
-          </a:prstGeom>
-        </p:spPr>
-      </p:pic>
-      <p:pic>
-        <p:nvPicPr>
-          <p:cNvPr id="14" name="Picture 13" descr="DST.png"/>
-          <p:cNvPicPr>
-            <a:picLocks noChangeAspect="1"/>
-          </p:cNvPicPr>
-          <p:nvPr/>
-        </p:nvPicPr>
-        <p:blipFill>
-          <a:blip r:embed="rId16">
-            <a:extLst>
-              <a:ext uri="{28A0092B-C50C-407E-A947-70E740481C1C}">
-                <a14:useLocalDpi xmlns:a14="http://schemas.microsoft.com/office/drawing/2010/main"/>
-              </a:ext>
-            </a:extLst>
-          </a:blip>
-          <a:stretch>
-            <a:fillRect/>
-          </a:stretch>
-        </p:blipFill>
-        <p:spPr>
-          <a:xfrm>
-            <a:off x="7163748" y="4550551"/>
-            <a:ext cx="704469" cy="634023"/>
-          </a:xfrm>
-          <a:prstGeom prst="rect">
-            <a:avLst/>
-          </a:prstGeom>
-        </p:spPr>
-      </p:pic>
-      <p:pic>
-        <p:nvPicPr>
-          <p:cNvPr id="12" name="Picture 11" descr="Balance Innovations.png"/>
-          <p:cNvPicPr>
-            <a:picLocks noChangeAspect="1"/>
-          </p:cNvPicPr>
-          <p:nvPr/>
-        </p:nvPicPr>
-        <p:blipFill>
-          <a:blip r:embed="rId17" cstate="hqprint">
-            <a:extLst>
-              <a:ext uri="{28A0092B-C50C-407E-A947-70E740481C1C}">
-                <a14:useLocalDpi xmlns:a14="http://schemas.microsoft.com/office/drawing/2010/main"/>
-              </a:ext>
-            </a:extLst>
-          </a:blip>
-          <a:stretch>
-            <a:fillRect/>
-          </a:stretch>
-        </p:blipFill>
-        <p:spPr>
-          <a:xfrm>
-            <a:off x="1682999" y="4881452"/>
-            <a:ext cx="662388" cy="523797"/>
-          </a:xfrm>
-          <a:prstGeom prst="rect">
-            <a:avLst/>
-          </a:prstGeom>
-        </p:spPr>
-      </p:pic>
-      <p:pic>
-        <p:nvPicPr>
-          <p:cNvPr id="16" name="Picture 15" descr="Jack Henry And Associates.png"/>
-          <p:cNvPicPr>
-            <a:picLocks noChangeAspect="1"/>
-          </p:cNvPicPr>
-          <p:nvPr/>
-        </p:nvPicPr>
-        <p:blipFill>
-          <a:blip r:embed="rId18">
-            <a:extLst>
-              <a:ext uri="{28A0092B-C50C-407E-A947-70E740481C1C}">
-                <a14:useLocalDpi xmlns:a14="http://schemas.microsoft.com/office/drawing/2010/main"/>
-              </a:ext>
-            </a:extLst>
-          </a:blip>
-          <a:stretch>
-            <a:fillRect/>
-          </a:stretch>
-        </p:blipFill>
-        <p:spPr>
-          <a:xfrm>
-            <a:off x="6944883" y="1972757"/>
-            <a:ext cx="2278005" cy="540213"/>
-          </a:xfrm>
-          <a:prstGeom prst="rect">
-            <a:avLst/>
-          </a:prstGeom>
-        </p:spPr>
-      </p:pic>
-      <p:pic>
-        <p:nvPicPr>
-          <p:cNvPr id="6" name="Picture 5"/>
-          <p:cNvPicPr>
-            <a:picLocks noChangeAspect="1"/>
-          </p:cNvPicPr>
-          <p:nvPr/>
-        </p:nvPicPr>
-        <p:blipFill>
-          <a:blip r:embed="rId19" cstate="hqprint">
-            <a:extLst>
-              <a:ext uri="{28A0092B-C50C-407E-A947-70E740481C1C}">
-                <a14:useLocalDpi xmlns:a14="http://schemas.microsoft.com/office/drawing/2010/main"/>
-              </a:ext>
-            </a:extLst>
-          </a:blip>
-          <a:stretch>
-            <a:fillRect/>
-          </a:stretch>
-        </p:blipFill>
-        <p:spPr>
-          <a:xfrm>
-            <a:off x="4437219" y="1957097"/>
-            <a:ext cx="2218400" cy="534100"/>
-          </a:xfrm>
-          <a:prstGeom prst="rect">
-            <a:avLst/>
-          </a:prstGeom>
-        </p:spPr>
-      </p:pic>
-      <p:pic>
-        <p:nvPicPr>
-          <p:cNvPr id="17" name="Picture 16" descr="2011_Commerce_4C.PNG"/>
-          <p:cNvPicPr>
-            <a:picLocks noChangeAspect="1"/>
-          </p:cNvPicPr>
-          <p:nvPr/>
-        </p:nvPicPr>
-        <p:blipFill>
-          <a:blip r:embed="rId20" cstate="hqprint">
-            <a:extLst>
-              <a:ext uri="{28A0092B-C50C-407E-A947-70E740481C1C}">
-                <a14:useLocalDpi xmlns:a14="http://schemas.microsoft.com/office/drawing/2010/main"/>
-              </a:ext>
-            </a:extLst>
-          </a:blip>
-          <a:stretch>
-            <a:fillRect/>
-          </a:stretch>
-        </p:blipFill>
-        <p:spPr>
-          <a:xfrm>
-            <a:off x="3918351" y="4623833"/>
-            <a:ext cx="1726884" cy="272809"/>
-          </a:xfrm>
-          <a:prstGeom prst="rect">
-            <a:avLst/>
-          </a:prstGeom>
-        </p:spPr>
-      </p:pic>
-      <p:pic>
-        <p:nvPicPr>
-          <p:cNvPr id="3" name="Picture 2"/>
-          <p:cNvPicPr>
-            <a:picLocks noChangeAspect="1"/>
-          </p:cNvPicPr>
-          <p:nvPr/>
-        </p:nvPicPr>
-        <p:blipFill>
-          <a:blip r:embed="rId21" cstate="hqprint">
-            <a:extLst>
-              <a:ext uri="{28A0092B-C50C-407E-A947-70E740481C1C}">
-                <a14:useLocalDpi xmlns:a14="http://schemas.microsoft.com/office/drawing/2010/main"/>
-              </a:ext>
-            </a:extLst>
-          </a:blip>
-          <a:stretch>
-            <a:fillRect/>
-          </a:stretch>
-        </p:blipFill>
-        <p:spPr>
-          <a:xfrm>
-            <a:off x="6932214" y="932265"/>
-            <a:ext cx="3303214" cy="803957"/>
-          </a:xfrm>
-          <a:prstGeom prst="rect">
-            <a:avLst/>
-          </a:prstGeom>
-        </p:spPr>
-      </p:pic>
-      <p:pic>
-        <p:nvPicPr>
-          <p:cNvPr id="40" name="Picture 39"/>
-          <p:cNvPicPr>
-            <a:picLocks noChangeAspect="1"/>
-          </p:cNvPicPr>
-          <p:nvPr/>
-        </p:nvPicPr>
-        <p:blipFill>
-          <a:blip r:embed="rId22">
-            <a:extLst>
-              <a:ext uri="{28A0092B-C50C-407E-A947-70E740481C1C}">
-                <a14:useLocalDpi xmlns:a14="http://schemas.microsoft.com/office/drawing/2010/main"/>
-              </a:ext>
-            </a:extLst>
-          </a:blip>
-          <a:stretch>
-            <a:fillRect/>
-          </a:stretch>
-        </p:blipFill>
-        <p:spPr>
-          <a:xfrm>
-            <a:off x="1649576" y="2442821"/>
-            <a:ext cx="2399407" cy="554030"/>
-          </a:xfrm>
-          <a:prstGeom prst="rect">
-            <a:avLst/>
-          </a:prstGeom>
-        </p:spPr>
-      </p:pic>
-      <p:pic>
-        <p:nvPicPr>
-          <p:cNvPr id="41" name="Picture 40"/>
-          <p:cNvPicPr>
-            <a:picLocks noChangeAspect="1"/>
-          </p:cNvPicPr>
-          <p:nvPr/>
-        </p:nvPicPr>
-        <p:blipFill>
-          <a:blip r:embed="rId23">
-            <a:extLst>
-              <a:ext uri="{28A0092B-C50C-407E-A947-70E740481C1C}">
-                <a14:useLocalDpi xmlns:a14="http://schemas.microsoft.com/office/drawing/2010/main"/>
-              </a:ext>
-            </a:extLst>
-          </a:blip>
-          <a:stretch>
-            <a:fillRect/>
-          </a:stretch>
-        </p:blipFill>
-        <p:spPr>
-          <a:xfrm>
-            <a:off x="7114714" y="3129376"/>
-            <a:ext cx="3019886" cy="668834"/>
-          </a:xfrm>
-          <a:prstGeom prst="rect">
-            <a:avLst/>
-          </a:prstGeom>
-        </p:spPr>
-      </p:pic>
-      <p:pic>
-        <p:nvPicPr>
-          <p:cNvPr id="2" name="Picture 1"/>
-          <p:cNvPicPr>
-            <a:picLocks noChangeAspect="1"/>
-          </p:cNvPicPr>
-          <p:nvPr/>
-        </p:nvPicPr>
-        <p:blipFill>
-          <a:blip r:embed="rId24">
-            <a:extLst>
-              <a:ext uri="{28A0092B-C50C-407E-A947-70E740481C1C}">
-                <a14:useLocalDpi xmlns:a14="http://schemas.microsoft.com/office/drawing/2010/main"/>
-              </a:ext>
-            </a:extLst>
-          </a:blip>
-          <a:stretch>
-            <a:fillRect/>
-          </a:stretch>
-        </p:blipFill>
-        <p:spPr>
-          <a:xfrm>
-            <a:off x="1814943" y="3060011"/>
-            <a:ext cx="1995608" cy="647223"/>
-          </a:xfrm>
-          <a:prstGeom prst="rect">
-            <a:avLst/>
-          </a:prstGeom>
-        </p:spPr>
-      </p:pic>
-      <p:sp>
-        <p:nvSpPr>
-          <p:cNvPr id="4" name="TextBox 3"/>
-          <p:cNvSpPr txBox="1"/>
-          <p:nvPr/>
-        </p:nvSpPr>
-        <p:spPr>
-          <a:xfrm>
-            <a:off x="-1397000" y="4318000"/>
-            <a:ext cx="184731" cy="369332"/>
-          </a:xfrm>
-          <a:prstGeom prst="rect">
-            <a:avLst/>
-          </a:prstGeom>
-          <a:noFill/>
-        </p:spPr>
-        <p:txBody>
-          <a:bodyPr wrap="none" rtlCol="0">
-            <a:spAutoFit/>
-          </a:bodyPr>
-          <a:lstStyle/>
-          <a:p>
-            <a:endParaRPr lang="en-US" dirty="0"/>
-          </a:p>
-        </p:txBody>
-      </p:sp>
-      <p:pic>
-        <p:nvPicPr>
-          <p:cNvPr id="7" name="Picture 6"/>
-          <p:cNvPicPr>
-            <a:picLocks noChangeAspect="1"/>
-          </p:cNvPicPr>
-          <p:nvPr/>
-        </p:nvPicPr>
-        <p:blipFill>
-          <a:blip r:embed="rId25">
-            <a:extLst>
-              <a:ext uri="{28A0092B-C50C-407E-A947-70E740481C1C}">
-                <a14:useLocalDpi xmlns:a14="http://schemas.microsoft.com/office/drawing/2010/main"/>
-              </a:ext>
-            </a:extLst>
-          </a:blip>
-          <a:stretch>
-            <a:fillRect/>
-          </a:stretch>
-        </p:blipFill>
-        <p:spPr>
-          <a:xfrm>
-            <a:off x="5902314" y="2556971"/>
-            <a:ext cx="2660893" cy="517151"/>
-          </a:xfrm>
-          <a:prstGeom prst="rect">
-            <a:avLst/>
-          </a:prstGeom>
-        </p:spPr>
-      </p:pic>
-      <p:pic>
-        <p:nvPicPr>
-          <p:cNvPr id="19" name="Picture 18"/>
-          <p:cNvPicPr>
-            <a:picLocks noChangeAspect="1"/>
-          </p:cNvPicPr>
-          <p:nvPr/>
-        </p:nvPicPr>
-        <p:blipFill>
-          <a:blip r:embed="rId26">
-            <a:extLst>
-              <a:ext uri="{28A0092B-C50C-407E-A947-70E740481C1C}">
-                <a14:useLocalDpi xmlns:a14="http://schemas.microsoft.com/office/drawing/2010/main"/>
-              </a:ext>
-            </a:extLst>
-          </a:blip>
-          <a:stretch>
-            <a:fillRect/>
-          </a:stretch>
-        </p:blipFill>
-        <p:spPr>
-          <a:xfrm>
-            <a:off x="4130960" y="2598241"/>
-            <a:ext cx="1460961" cy="807535"/>
-          </a:xfrm>
-          <a:prstGeom prst="rect">
-            <a:avLst/>
-          </a:prstGeom>
-        </p:spPr>
-      </p:pic>
-      <p:pic>
-        <p:nvPicPr>
-          <p:cNvPr id="22" name="Picture 21"/>
-          <p:cNvPicPr>
-            <a:picLocks noChangeAspect="1"/>
-          </p:cNvPicPr>
-          <p:nvPr/>
-        </p:nvPicPr>
-        <p:blipFill>
-          <a:blip r:embed="rId27" cstate="hqprint">
-            <a:extLst>
-              <a:ext uri="{28A0092B-C50C-407E-A947-70E740481C1C}">
-                <a14:useLocalDpi xmlns:a14="http://schemas.microsoft.com/office/drawing/2010/main"/>
-              </a:ext>
-            </a:extLst>
-          </a:blip>
-          <a:stretch>
-            <a:fillRect/>
-          </a:stretch>
-        </p:blipFill>
-        <p:spPr>
-          <a:xfrm>
-            <a:off x="8041248" y="4614023"/>
-            <a:ext cx="1182931" cy="434156"/>
-          </a:xfrm>
-          <a:prstGeom prst="rect">
-            <a:avLst/>
-          </a:prstGeom>
-        </p:spPr>
-      </p:pic>
-      <p:pic>
-        <p:nvPicPr>
-          <p:cNvPr id="26" name="Picture 25"/>
-          <p:cNvPicPr>
-            <a:picLocks noChangeAspect="1"/>
-          </p:cNvPicPr>
-          <p:nvPr/>
-        </p:nvPicPr>
-        <p:blipFill>
-          <a:blip r:embed="rId28" cstate="hqprint">
-            <a:extLst>
-              <a:ext uri="{28A0092B-C50C-407E-A947-70E740481C1C}">
-                <a14:useLocalDpi xmlns:a14="http://schemas.microsoft.com/office/drawing/2010/main"/>
-              </a:ext>
-            </a:extLst>
-          </a:blip>
-          <a:stretch>
-            <a:fillRect/>
-          </a:stretch>
-        </p:blipFill>
-        <p:spPr>
-          <a:xfrm>
-            <a:off x="9411385" y="4502937"/>
-            <a:ext cx="972480" cy="455120"/>
-          </a:xfrm>
-          <a:prstGeom prst="rect">
-            <a:avLst/>
-          </a:prstGeom>
-        </p:spPr>
-      </p:pic>
-      <p:pic>
-        <p:nvPicPr>
-          <p:cNvPr id="27" name="Picture 26"/>
-          <p:cNvPicPr>
-            <a:picLocks noChangeAspect="1"/>
-          </p:cNvPicPr>
-          <p:nvPr/>
-        </p:nvPicPr>
-        <p:blipFill>
-          <a:blip r:embed="rId29" cstate="hqprint">
-            <a:extLst>
-              <a:ext uri="{28A0092B-C50C-407E-A947-70E740481C1C}">
-                <a14:useLocalDpi xmlns:a14="http://schemas.microsoft.com/office/drawing/2010/main"/>
-              </a:ext>
-            </a:extLst>
-          </a:blip>
-          <a:stretch>
-            <a:fillRect/>
-          </a:stretch>
-        </p:blipFill>
-        <p:spPr>
-          <a:xfrm>
-            <a:off x="5810065" y="4464203"/>
-            <a:ext cx="1208945" cy="392355"/>
-          </a:xfrm>
-          <a:prstGeom prst="rect">
-            <a:avLst/>
-          </a:prstGeom>
-        </p:spPr>
-      </p:pic>
-      <p:pic>
-        <p:nvPicPr>
-          <p:cNvPr id="30" name="Picture 29"/>
-          <p:cNvPicPr>
-            <a:picLocks noChangeAspect="1"/>
-          </p:cNvPicPr>
-          <p:nvPr/>
-        </p:nvPicPr>
-        <p:blipFill>
-          <a:blip r:embed="rId30" cstate="hqprint">
-            <a:extLst>
-              <a:ext uri="{28A0092B-C50C-407E-A947-70E740481C1C}">
-                <a14:useLocalDpi xmlns:a14="http://schemas.microsoft.com/office/drawing/2010/main"/>
-              </a:ext>
-            </a:extLst>
-          </a:blip>
-          <a:stretch>
-            <a:fillRect/>
-          </a:stretch>
-        </p:blipFill>
-        <p:spPr>
-          <a:xfrm>
-            <a:off x="5590324" y="5490809"/>
-            <a:ext cx="1383216" cy="241131"/>
-          </a:xfrm>
-          <a:prstGeom prst="rect">
-            <a:avLst/>
-          </a:prstGeom>
-        </p:spPr>
-      </p:pic>
-      <p:pic>
-        <p:nvPicPr>
-          <p:cNvPr id="34" name="Picture 33"/>
-          <p:cNvPicPr>
-            <a:picLocks noChangeAspect="1"/>
-          </p:cNvPicPr>
-          <p:nvPr/>
-        </p:nvPicPr>
-        <p:blipFill>
-          <a:blip r:embed="rId31">
-            <a:extLst>
-              <a:ext uri="{28A0092B-C50C-407E-A947-70E740481C1C}">
-                <a14:useLocalDpi xmlns:a14="http://schemas.microsoft.com/office/drawing/2010/main"/>
-              </a:ext>
-            </a:extLst>
-          </a:blip>
-          <a:stretch>
-            <a:fillRect/>
-          </a:stretch>
-        </p:blipFill>
-        <p:spPr>
-          <a:xfrm>
-            <a:off x="2806874" y="4282429"/>
-            <a:ext cx="1420897" cy="308891"/>
-          </a:xfrm>
-          <a:prstGeom prst="rect">
-            <a:avLst/>
-          </a:prstGeom>
-        </p:spPr>
-      </p:pic>
-      <p:pic>
-        <p:nvPicPr>
-          <p:cNvPr id="35" name="Picture 34"/>
-          <p:cNvPicPr>
-            <a:picLocks noChangeAspect="1"/>
-          </p:cNvPicPr>
-          <p:nvPr/>
-        </p:nvPicPr>
-        <p:blipFill>
-          <a:blip r:embed="rId32" cstate="hqprint">
-            <a:extLst>
-              <a:ext uri="{28A0092B-C50C-407E-A947-70E740481C1C}">
-                <a14:useLocalDpi xmlns:a14="http://schemas.microsoft.com/office/drawing/2010/main"/>
-              </a:ext>
-            </a:extLst>
-          </a:blip>
-          <a:stretch>
-            <a:fillRect/>
-          </a:stretch>
-        </p:blipFill>
-        <p:spPr>
-          <a:xfrm>
-            <a:off x="7276127" y="3925589"/>
-            <a:ext cx="1038135" cy="497440"/>
-          </a:xfrm>
-          <a:prstGeom prst="rect">
-            <a:avLst/>
-          </a:prstGeom>
-        </p:spPr>
-      </p:pic>
-      <p:pic>
-        <p:nvPicPr>
-          <p:cNvPr id="36" name="Picture 35"/>
-          <p:cNvPicPr>
-            <a:picLocks noChangeAspect="1"/>
-          </p:cNvPicPr>
-          <p:nvPr/>
-        </p:nvPicPr>
-        <p:blipFill>
-          <a:blip r:embed="rId33" cstate="hqprint">
-            <a:extLst>
-              <a:ext uri="{28A0092B-C50C-407E-A947-70E740481C1C}">
-                <a14:useLocalDpi xmlns:a14="http://schemas.microsoft.com/office/drawing/2010/main"/>
-              </a:ext>
-            </a:extLst>
-          </a:blip>
-          <a:stretch>
-            <a:fillRect/>
-          </a:stretch>
-        </p:blipFill>
-        <p:spPr>
-          <a:xfrm>
-            <a:off x="1797883" y="5832152"/>
-            <a:ext cx="1317088" cy="243846"/>
-          </a:xfrm>
-          <a:prstGeom prst="rect">
-            <a:avLst/>
-          </a:prstGeom>
-        </p:spPr>
-      </p:pic>
-      <p:pic>
-        <p:nvPicPr>
-          <p:cNvPr id="38" name="Picture 37"/>
-          <p:cNvPicPr>
-            <a:picLocks noChangeAspect="1"/>
-          </p:cNvPicPr>
-          <p:nvPr/>
-        </p:nvPicPr>
-        <p:blipFill>
-          <a:blip r:embed="rId34" cstate="hqprint">
-            <a:extLst>
-              <a:ext uri="{28A0092B-C50C-407E-A947-70E740481C1C}">
-                <a14:useLocalDpi xmlns:a14="http://schemas.microsoft.com/office/drawing/2010/main"/>
-              </a:ext>
-            </a:extLst>
-          </a:blip>
-          <a:stretch>
-            <a:fillRect/>
-          </a:stretch>
-        </p:blipFill>
-        <p:spPr>
-          <a:xfrm>
-            <a:off x="5750025" y="4961127"/>
-            <a:ext cx="1278577" cy="386287"/>
-          </a:xfrm>
-          <a:prstGeom prst="rect">
-            <a:avLst/>
-          </a:prstGeom>
-        </p:spPr>
-      </p:pic>
-      <p:pic>
-        <p:nvPicPr>
-          <p:cNvPr id="43" name="Picture 42"/>
-          <p:cNvPicPr>
-            <a:picLocks noChangeAspect="1"/>
-          </p:cNvPicPr>
-          <p:nvPr/>
-        </p:nvPicPr>
-        <p:blipFill>
-          <a:blip r:embed="rId35" cstate="hqprint">
-            <a:extLst>
-              <a:ext uri="{28A0092B-C50C-407E-A947-70E740481C1C}">
-                <a14:useLocalDpi xmlns:a14="http://schemas.microsoft.com/office/drawing/2010/main"/>
-              </a:ext>
-            </a:extLst>
-          </a:blip>
-          <a:stretch>
-            <a:fillRect/>
-          </a:stretch>
-        </p:blipFill>
-        <p:spPr>
-          <a:xfrm>
-            <a:off x="3860968" y="5496449"/>
-            <a:ext cx="861350" cy="626437"/>
-          </a:xfrm>
-          <a:prstGeom prst="rect">
-            <a:avLst/>
-          </a:prstGeom>
-        </p:spPr>
-      </p:pic>
-      <p:pic>
-        <p:nvPicPr>
-          <p:cNvPr id="45" name="Picture 44"/>
-          <p:cNvPicPr>
-            <a:picLocks noChangeAspect="1"/>
-          </p:cNvPicPr>
-          <p:nvPr/>
-        </p:nvPicPr>
-        <p:blipFill>
-          <a:blip r:embed="rId36">
-            <a:extLst>
-              <a:ext uri="{28A0092B-C50C-407E-A947-70E740481C1C}">
-                <a14:useLocalDpi xmlns:a14="http://schemas.microsoft.com/office/drawing/2010/main"/>
-              </a:ext>
-            </a:extLst>
-          </a:blip>
-          <a:stretch>
-            <a:fillRect/>
-          </a:stretch>
-        </p:blipFill>
-        <p:spPr>
-          <a:xfrm>
-            <a:off x="9337734" y="5546820"/>
-            <a:ext cx="1176904" cy="476915"/>
-          </a:xfrm>
-          <a:prstGeom prst="rect">
-            <a:avLst/>
-          </a:prstGeom>
-        </p:spPr>
-      </p:pic>
-      <p:pic>
-        <p:nvPicPr>
-          <p:cNvPr id="46" name="Picture 45"/>
-          <p:cNvPicPr>
-            <a:picLocks noChangeAspect="1"/>
-          </p:cNvPicPr>
-          <p:nvPr/>
-        </p:nvPicPr>
-        <p:blipFill>
-          <a:blip r:embed="rId37" cstate="hqprint">
-            <a:extLst>
-              <a:ext uri="{28A0092B-C50C-407E-A947-70E740481C1C}">
-                <a14:useLocalDpi xmlns:a14="http://schemas.microsoft.com/office/drawing/2010/main"/>
-              </a:ext>
-            </a:extLst>
-          </a:blip>
-          <a:stretch>
-            <a:fillRect/>
-          </a:stretch>
-        </p:blipFill>
-        <p:spPr>
-          <a:xfrm>
-            <a:off x="4213968" y="4992965"/>
-            <a:ext cx="1274844" cy="333460"/>
-          </a:xfrm>
-          <a:prstGeom prst="rect">
-            <a:avLst/>
-          </a:prstGeom>
-        </p:spPr>
-      </p:pic>
-      <p:pic>
-        <p:nvPicPr>
-          <p:cNvPr id="47" name="Picture 46"/>
-          <p:cNvPicPr>
-            <a:picLocks noChangeAspect="1"/>
-          </p:cNvPicPr>
-          <p:nvPr/>
-        </p:nvPicPr>
-        <p:blipFill>
-          <a:blip r:embed="rId38">
-            <a:extLst>
-              <a:ext uri="{28A0092B-C50C-407E-A947-70E740481C1C}">
-                <a14:useLocalDpi xmlns:a14="http://schemas.microsoft.com/office/drawing/2010/main"/>
-              </a:ext>
-            </a:extLst>
-          </a:blip>
-          <a:stretch>
-            <a:fillRect/>
-          </a:stretch>
-        </p:blipFill>
-        <p:spPr>
-          <a:xfrm>
-            <a:off x="7084929" y="5492803"/>
-            <a:ext cx="1130970" cy="461272"/>
-          </a:xfrm>
-          <a:prstGeom prst="rect">
-            <a:avLst/>
-          </a:prstGeom>
-        </p:spPr>
-      </p:pic>
-      <p:pic>
-        <p:nvPicPr>
-          <p:cNvPr id="9" name="Picture 8"/>
-          <p:cNvPicPr>
-            <a:picLocks noChangeAspect="1"/>
-          </p:cNvPicPr>
-          <p:nvPr/>
-        </p:nvPicPr>
-        <p:blipFill>
-          <a:blip r:embed="rId39" cstate="hqprint">
-            <a:extLst>
-              <a:ext uri="{28A0092B-C50C-407E-A947-70E740481C1C}">
-                <a14:useLocalDpi xmlns:a14="http://schemas.microsoft.com/office/drawing/2010/main"/>
-              </a:ext>
-            </a:extLst>
-          </a:blip>
-          <a:stretch>
-            <a:fillRect/>
-          </a:stretch>
-        </p:blipFill>
-        <p:spPr>
-          <a:xfrm>
-            <a:off x="4799560" y="5513369"/>
-            <a:ext cx="624987" cy="624987"/>
-          </a:xfrm>
-          <a:prstGeom prst="rect">
-            <a:avLst/>
-          </a:prstGeom>
-        </p:spPr>
-      </p:pic>
-      <p:pic>
-        <p:nvPicPr>
-          <p:cNvPr id="44" name="Picture 43" descr="CMH KC blue white"/>
-          <p:cNvPicPr>
-            <a:picLocks noChangeAspect="1"/>
-          </p:cNvPicPr>
-          <p:nvPr/>
-        </p:nvPicPr>
-        <p:blipFill>
-          <a:blip r:embed="rId40" cstate="print"/>
-          <a:srcRect/>
-          <a:stretch>
-            <a:fillRect/>
-          </a:stretch>
-        </p:blipFill>
-        <p:spPr bwMode="auto">
-          <a:xfrm>
-            <a:off x="1682999" y="6289705"/>
-            <a:ext cx="1556818" cy="324337"/>
-          </a:xfrm>
-          <a:prstGeom prst="rect">
-            <a:avLst/>
-          </a:prstGeom>
-          <a:noFill/>
-          <a:ln w="9525">
-            <a:noFill/>
-            <a:miter lim="800000"/>
-            <a:headEnd/>
-            <a:tailEnd/>
-          </a:ln>
-        </p:spPr>
-      </p:pic>
-      <p:pic>
-        <p:nvPicPr>
-          <p:cNvPr id="13" name="Picture 12"/>
-          <p:cNvPicPr>
-            <a:picLocks noChangeAspect="1"/>
-          </p:cNvPicPr>
-          <p:nvPr/>
-        </p:nvPicPr>
-        <p:blipFill>
-          <a:blip r:embed="rId41" cstate="hqprint">
-            <a:extLst>
-              <a:ext uri="{28A0092B-C50C-407E-A947-70E740481C1C}">
-                <a14:useLocalDpi xmlns:a14="http://schemas.microsoft.com/office/drawing/2010/main"/>
-              </a:ext>
-            </a:extLst>
-          </a:blip>
-          <a:stretch>
-            <a:fillRect/>
-          </a:stretch>
-        </p:blipFill>
-        <p:spPr>
-          <a:xfrm>
-            <a:off x="2542041" y="5339221"/>
-            <a:ext cx="1377054" cy="405394"/>
-          </a:xfrm>
-          <a:prstGeom prst="rect">
-            <a:avLst/>
-          </a:prstGeom>
-        </p:spPr>
-      </p:pic>
-      <p:pic>
-        <p:nvPicPr>
-          <p:cNvPr id="18" name="Picture 17"/>
-          <p:cNvPicPr>
-            <a:picLocks noChangeAspect="1"/>
-          </p:cNvPicPr>
-          <p:nvPr/>
-        </p:nvPicPr>
-        <p:blipFill>
-          <a:blip r:embed="rId42" cstate="hqprint">
-            <a:extLst>
-              <a:ext uri="{28A0092B-C50C-407E-A947-70E740481C1C}">
-                <a14:useLocalDpi xmlns:a14="http://schemas.microsoft.com/office/drawing/2010/main"/>
-              </a:ext>
-            </a:extLst>
-          </a:blip>
-          <a:stretch>
-            <a:fillRect/>
-          </a:stretch>
-        </p:blipFill>
-        <p:spPr>
-          <a:xfrm>
-            <a:off x="4115645" y="5773295"/>
-            <a:ext cx="1863541" cy="1440009"/>
-          </a:xfrm>
-          <a:prstGeom prst="rect">
-            <a:avLst/>
-          </a:prstGeom>
-        </p:spPr>
-      </p:pic>
-      <p:pic>
-        <p:nvPicPr>
-          <p:cNvPr id="20" name="Picture 19"/>
-          <p:cNvPicPr>
-            <a:picLocks noChangeAspect="1"/>
-          </p:cNvPicPr>
-          <p:nvPr/>
-        </p:nvPicPr>
-        <p:blipFill>
-          <a:blip r:embed="rId43" cstate="hqprint">
-            <a:extLst>
-              <a:ext uri="{28A0092B-C50C-407E-A947-70E740481C1C}">
-                <a14:useLocalDpi xmlns:a14="http://schemas.microsoft.com/office/drawing/2010/main"/>
-              </a:ext>
-            </a:extLst>
-          </a:blip>
-          <a:stretch>
-            <a:fillRect/>
-          </a:stretch>
-        </p:blipFill>
-        <p:spPr>
-          <a:xfrm>
-            <a:off x="9624712" y="5998076"/>
-            <a:ext cx="941923" cy="839643"/>
-          </a:xfrm>
-          <a:prstGeom prst="rect">
-            <a:avLst/>
-          </a:prstGeom>
-        </p:spPr>
-      </p:pic>
-      <p:pic>
-        <p:nvPicPr>
-          <p:cNvPr id="48" name="Picture 47"/>
-          <p:cNvPicPr>
-            <a:picLocks noChangeAspect="1"/>
-          </p:cNvPicPr>
-          <p:nvPr/>
-        </p:nvPicPr>
-        <p:blipFill>
-          <a:blip r:embed="rId44" cstate="hqprint">
-            <a:extLst>
-              <a:ext uri="{28A0092B-C50C-407E-A947-70E740481C1C}">
-                <a14:useLocalDpi xmlns:a14="http://schemas.microsoft.com/office/drawing/2010/main"/>
-              </a:ext>
-            </a:extLst>
-          </a:blip>
-          <a:stretch>
-            <a:fillRect/>
-          </a:stretch>
-        </p:blipFill>
-        <p:spPr>
-          <a:xfrm>
-            <a:off x="5631959" y="5809340"/>
-            <a:ext cx="553396" cy="558931"/>
-          </a:xfrm>
-          <a:prstGeom prst="rect">
-            <a:avLst/>
-          </a:prstGeom>
-        </p:spPr>
-      </p:pic>
-      <p:pic>
-        <p:nvPicPr>
-          <p:cNvPr id="49" name="Picture 48"/>
-          <p:cNvPicPr>
-            <a:picLocks noChangeAspect="1"/>
-          </p:cNvPicPr>
-          <p:nvPr/>
-        </p:nvPicPr>
-        <p:blipFill>
-          <a:blip r:embed="rId45" cstate="hqprint">
-            <a:extLst>
-              <a:ext uri="{28A0092B-C50C-407E-A947-70E740481C1C}">
-                <a14:useLocalDpi xmlns:a14="http://schemas.microsoft.com/office/drawing/2010/main"/>
-              </a:ext>
-            </a:extLst>
-          </a:blip>
-          <a:stretch>
-            <a:fillRect/>
-          </a:stretch>
-        </p:blipFill>
-        <p:spPr>
-          <a:xfrm>
-            <a:off x="7636540" y="6270582"/>
-            <a:ext cx="1738527" cy="309287"/>
-          </a:xfrm>
-          <a:prstGeom prst="rect">
-            <a:avLst/>
-          </a:prstGeom>
-        </p:spPr>
-      </p:pic>
-      <p:pic>
-        <p:nvPicPr>
-          <p:cNvPr id="50" name="Picture 49"/>
-          <p:cNvPicPr>
-            <a:picLocks noChangeAspect="1"/>
-          </p:cNvPicPr>
-          <p:nvPr/>
-        </p:nvPicPr>
-        <p:blipFill>
-          <a:blip r:embed="rId46" cstate="hqprint">
-            <a:extLst>
-              <a:ext uri="{28A0092B-C50C-407E-A947-70E740481C1C}">
-                <a14:useLocalDpi xmlns:a14="http://schemas.microsoft.com/office/drawing/2010/main"/>
-              </a:ext>
-            </a:extLst>
-          </a:blip>
-          <a:stretch>
-            <a:fillRect/>
-          </a:stretch>
-        </p:blipFill>
-        <p:spPr>
-          <a:xfrm>
-            <a:off x="6276109" y="6061586"/>
-            <a:ext cx="1110786" cy="608101"/>
-          </a:xfrm>
-          <a:prstGeom prst="rect">
-            <a:avLst/>
-          </a:prstGeom>
-        </p:spPr>
-      </p:pic>
-      <p:pic>
-        <p:nvPicPr>
-          <p:cNvPr id="51" name="Picture 50"/>
-          <p:cNvPicPr>
-            <a:picLocks noChangeAspect="1"/>
-          </p:cNvPicPr>
-          <p:nvPr/>
-        </p:nvPicPr>
-        <p:blipFill>
-          <a:blip r:embed="rId47" cstate="hqprint">
-            <a:extLst>
-              <a:ext uri="{28A0092B-C50C-407E-A947-70E740481C1C}">
-                <a14:useLocalDpi xmlns:a14="http://schemas.microsoft.com/office/drawing/2010/main"/>
-              </a:ext>
-            </a:extLst>
-          </a:blip>
-          <a:stretch>
-            <a:fillRect/>
-          </a:stretch>
-        </p:blipFill>
-        <p:spPr>
-          <a:xfrm>
-            <a:off x="1675864" y="633604"/>
-            <a:ext cx="2500066" cy="1069364"/>
-          </a:xfrm>
-          <a:prstGeom prst="rect">
-            <a:avLst/>
-          </a:prstGeom>
-        </p:spPr>
-      </p:pic>
-      <p:pic>
-        <p:nvPicPr>
-          <p:cNvPr id="15" name="Picture 14"/>
-          <p:cNvPicPr>
-            <a:picLocks noChangeAspect="1"/>
-          </p:cNvPicPr>
-          <p:nvPr/>
-        </p:nvPicPr>
-        <p:blipFill>
-          <a:blip r:embed="rId48" cstate="hqprint">
-            <a:extLst>
-              <a:ext uri="{28A0092B-C50C-407E-A947-70E740481C1C}">
-                <a14:useLocalDpi xmlns:a14="http://schemas.microsoft.com/office/drawing/2010/main"/>
-              </a:ext>
-            </a:extLst>
-          </a:blip>
-          <a:stretch>
-            <a:fillRect/>
-          </a:stretch>
-        </p:blipFill>
-        <p:spPr>
-          <a:xfrm>
-            <a:off x="8139639" y="5270494"/>
-            <a:ext cx="1081778" cy="727582"/>
-          </a:xfrm>
-          <a:prstGeom prst="rect">
-            <a:avLst/>
-          </a:prstGeom>
-        </p:spPr>
-      </p:pic>
-      <p:sp>
-        <p:nvSpPr>
-          <p:cNvPr id="52" name="TextBox 51"/>
-          <p:cNvSpPr txBox="1"/>
-          <p:nvPr/>
-        </p:nvSpPr>
-        <p:spPr>
-          <a:xfrm>
-            <a:off x="13563600" y="3924300"/>
-            <a:ext cx="184731" cy="369332"/>
-          </a:xfrm>
-          <a:prstGeom prst="rect">
-            <a:avLst/>
-          </a:prstGeom>
-          <a:noFill/>
-        </p:spPr>
-        <p:txBody>
-          <a:bodyPr wrap="none" rtlCol="0">
-            <a:spAutoFit/>
-          </a:bodyPr>
-          <a:lstStyle/>
-          <a:p>
-            <a:endParaRPr lang="en-US"/>
-          </a:p>
-        </p:txBody>
-      </p:sp>
-    </p:spTree>
-    <p:extLst>
-      <p:ext uri="{BB962C8B-B14F-4D97-AF65-F5344CB8AC3E}">
-        <p14:creationId xmlns:p14="http://schemas.microsoft.com/office/powerpoint/2010/main" val="3354011860"/>
-      </p:ext>
-    </p:extLst>
-  </p:cSld>
-  <p:clrMapOvr>
-    <a:masterClrMapping/>
-  </p:clrMapOvr>
-</p:sld>
-</file>
-
-<file path=ppt/slides/slide3.xml><?xml version="1.0" encoding="utf-8"?>
-<p:sld xmlns:a="http://schemas.openxmlformats.org/drawingml/2006/main" xmlns:r="http://schemas.openxmlformats.org/officeDocument/2006/relationships" xmlns:p="http://schemas.openxmlformats.org/presentationml/2006/main">
-  <p:cSld>
-    <p:spTree>
-      <p:nvGrpSpPr>
-        <p:cNvPr id="1" name=""/>
-        <p:cNvGrpSpPr/>
-        <p:nvPr/>
-      </p:nvGrpSpPr>
-      <p:grpSpPr>
-        <a:xfrm>
-          <a:off x="0" y="0"/>
-          <a:ext cx="0" cy="0"/>
-          <a:chOff x="0" y="0"/>
-          <a:chExt cx="0" cy="0"/>
-        </a:xfrm>
-      </p:grpSpPr>
-      <p:sp>
-        <p:nvSpPr>
-          <p:cNvPr id="2" name="Title 1"/>
-          <p:cNvSpPr>
-            <a:spLocks noGrp="1"/>
-          </p:cNvSpPr>
-          <p:nvPr>
-            <p:ph type="title"/>
-          </p:nvPr>
-        </p:nvSpPr>
-        <p:spPr/>
-        <p:txBody>
-          <a:bodyPr/>
-          <a:lstStyle/>
-          <a:p>
-            <a:r>
-              <a:rPr lang="en-US" dirty="0"/>
-              <a:t>First things first</a:t>
-            </a:r>
-          </a:p>
-        </p:txBody>
-      </p:sp>
-      <p:sp>
-        <p:nvSpPr>
-          <p:cNvPr id="3" name="Content Placeholder 2"/>
-          <p:cNvSpPr>
-            <a:spLocks noGrp="1"/>
-          </p:cNvSpPr>
-          <p:nvPr>
-            <p:ph idx="1"/>
-          </p:nvPr>
-        </p:nvSpPr>
-        <p:spPr/>
-        <p:txBody>
-          <a:bodyPr/>
-          <a:lstStyle/>
-          <a:p>
-            <a:r>
-              <a:rPr lang="en-US" dirty="0"/>
-              <a:t>Code, links, and more at </a:t>
-            </a:r>
-            <a:r>
-              <a:rPr lang="en-US" dirty="0">
-                <a:hlinkClick r:id="rId2"/>
-              </a:rPr>
-              <a:t>angular2.schneids.net</a:t>
-            </a:r>
-            <a:endParaRPr lang="en-US" dirty="0"/>
-          </a:p>
-          <a:p>
-            <a:r>
-              <a:rPr lang="en-US" dirty="0"/>
-              <a:t>Please rate my talk on </a:t>
-            </a:r>
-            <a:r>
-              <a:rPr lang="en-US" dirty="0" err="1"/>
-              <a:t>SpeakerRate</a:t>
-            </a:r>
-            <a:r>
-              <a:rPr lang="en-US" dirty="0"/>
-              <a:t>!</a:t>
-            </a:r>
-          </a:p>
-        </p:txBody>
-      </p:sp>
-    </p:spTree>
-    <p:extLst>
-      <p:ext uri="{BB962C8B-B14F-4D97-AF65-F5344CB8AC3E}">
-        <p14:creationId xmlns:p14="http://schemas.microsoft.com/office/powerpoint/2010/main" val="938819649"/>
-      </p:ext>
-    </p:extLst>
-  </p:cSld>
-  <p:clrMapOvr>
-    <a:masterClrMapping/>
-  </p:clrMapOvr>
-</p:sld>
-</file>
-
-<file path=ppt/slides/slide4.xml><?xml version="1.0" encoding="utf-8"?>
-<p:sld xmlns:a="http://schemas.openxmlformats.org/drawingml/2006/main" xmlns:r="http://schemas.openxmlformats.org/officeDocument/2006/relationships" xmlns:p="http://schemas.openxmlformats.org/presentationml/2006/main">
-  <p:cSld>
-    <p:spTree>
-      <p:nvGrpSpPr>
-        <p:cNvPr id="1" name=""/>
-        <p:cNvGrpSpPr/>
-        <p:nvPr/>
-      </p:nvGrpSpPr>
-      <p:grpSpPr>
-        <a:xfrm>
-          <a:off x="0" y="0"/>
-          <a:ext cx="0" cy="0"/>
-          <a:chOff x="0" y="0"/>
-          <a:chExt cx="0" cy="0"/>
-        </a:xfrm>
-      </p:grpSpPr>
-      <p:sp>
-        <p:nvSpPr>
-          <p:cNvPr id="2" name="Title 1"/>
-          <p:cNvSpPr>
-            <a:spLocks noGrp="1"/>
-          </p:cNvSpPr>
-          <p:nvPr>
-            <p:ph type="title"/>
-          </p:nvPr>
-        </p:nvSpPr>
-        <p:spPr/>
-        <p:txBody>
-          <a:bodyPr/>
-          <a:lstStyle/>
-          <a:p>
-            <a:r>
-              <a:rPr lang="en-US" dirty="0"/>
-              <a:t>About Me</a:t>
-            </a:r>
-          </a:p>
-        </p:txBody>
-      </p:sp>
-      <p:sp>
-        <p:nvSpPr>
-          <p:cNvPr id="3" name="Content Placeholder 2"/>
-          <p:cNvSpPr>
-            <a:spLocks noGrp="1"/>
-          </p:cNvSpPr>
-          <p:nvPr>
-            <p:ph idx="1"/>
-          </p:nvPr>
-        </p:nvSpPr>
-        <p:spPr/>
-        <p:txBody>
-          <a:bodyPr>
-            <a:normAutofit lnSpcReduction="10000"/>
-          </a:bodyPr>
-          <a:lstStyle/>
-          <a:p>
-            <a:r>
-              <a:rPr lang="en-US" dirty="0"/>
-              <a:t>Platform Architect at </a:t>
-            </a:r>
-            <a:r>
-              <a:rPr lang="en-US" dirty="0" err="1"/>
-              <a:t>Ryvit</a:t>
-            </a:r>
-            <a:endParaRPr lang="en-US" dirty="0"/>
-          </a:p>
-          <a:p>
-            <a:r>
-              <a:rPr lang="en-US" dirty="0"/>
-              <a:t>Consultant</a:t>
-            </a:r>
-          </a:p>
-          <a:p>
-            <a:r>
-              <a:rPr lang="en-US" dirty="0"/>
-              <a:t>Web developer</a:t>
-            </a:r>
-          </a:p>
-          <a:p>
-            <a:r>
-              <a:rPr lang="en-US" dirty="0"/>
-              <a:t>AngularJS 1/2, ASP.NET, C#</a:t>
-            </a:r>
-          </a:p>
-          <a:p>
-            <a:endParaRPr lang="en-US" dirty="0"/>
-          </a:p>
-          <a:p>
-            <a:pPr marL="0" indent="0">
-              <a:buNone/>
-            </a:pPr>
-            <a:r>
-              <a:rPr lang="en-US" dirty="0"/>
-              <a:t>Twitter: @</a:t>
-            </a:r>
-            <a:r>
-              <a:rPr lang="en-US" dirty="0" err="1"/>
-              <a:t>schneidenbach</a:t>
-            </a:r>
-            <a:endParaRPr lang="en-US" dirty="0"/>
-          </a:p>
-          <a:p>
-            <a:pPr marL="0" indent="0">
-              <a:buNone/>
-            </a:pPr>
-            <a:r>
-              <a:rPr lang="en-US" dirty="0" err="1"/>
-              <a:t>github.com</a:t>
-            </a:r>
-            <a:r>
-              <a:rPr lang="en-US" dirty="0"/>
-              <a:t>/</a:t>
-            </a:r>
-            <a:r>
-              <a:rPr lang="en-US" dirty="0" err="1"/>
-              <a:t>schneidenbach</a:t>
-            </a:r>
-            <a:endParaRPr lang="en-US" dirty="0"/>
-          </a:p>
-          <a:p>
-            <a:pPr marL="0" indent="0">
-              <a:buNone/>
-            </a:pPr>
-            <a:r>
-              <a:rPr lang="en-US" dirty="0" err="1"/>
-              <a:t>sas.projects@me.com</a:t>
-            </a:r>
-            <a:endParaRPr lang="en-US" dirty="0"/>
-          </a:p>
-          <a:p>
-            <a:pPr marL="0" indent="0">
-              <a:buNone/>
-            </a:pPr>
-            <a:r>
-              <a:rPr lang="en-US" dirty="0"/>
-              <a:t>Website: </a:t>
-            </a:r>
-            <a:r>
-              <a:rPr lang="en-US" dirty="0" err="1"/>
-              <a:t>schneids.net</a:t>
-            </a:r>
-            <a:endParaRPr lang="en-US" dirty="0"/>
-          </a:p>
-        </p:txBody>
-      </p:sp>
-      <p:pic>
-        <p:nvPicPr>
-          <p:cNvPr id="4" name="Picture 3"/>
-          <p:cNvPicPr>
-            <a:picLocks noChangeAspect="1"/>
-          </p:cNvPicPr>
-          <p:nvPr/>
-        </p:nvPicPr>
-        <p:blipFill>
-          <a:blip r:embed="rId2"/>
-          <a:stretch>
-            <a:fillRect/>
-          </a:stretch>
-        </p:blipFill>
-        <p:spPr>
-          <a:xfrm>
-            <a:off x="7219164" y="3589117"/>
-            <a:ext cx="4007904" cy="2134208"/>
-          </a:xfrm>
-          <a:prstGeom prst="rect">
-            <a:avLst/>
-          </a:prstGeom>
-        </p:spPr>
-      </p:pic>
-    </p:spTree>
-    <p:extLst>
-      <p:ext uri="{BB962C8B-B14F-4D97-AF65-F5344CB8AC3E}">
-        <p14:creationId xmlns:p14="http://schemas.microsoft.com/office/powerpoint/2010/main" val="2648786204"/>
-      </p:ext>
-    </p:extLst>
-  </p:cSld>
-  <p:clrMapOvr>
-    <a:masterClrMapping/>
-  </p:clrMapOvr>
-</p:sld>
-</file>
-
-<file path=ppt/slides/slide5.xml><?xml version="1.0" encoding="utf-8"?>
-<p:sld xmlns:a="http://schemas.openxmlformats.org/drawingml/2006/main" xmlns:r="http://schemas.openxmlformats.org/officeDocument/2006/relationships" xmlns:p="http://schemas.openxmlformats.org/presentationml/2006/main">
-  <p:cSld>
-    <p:spTree>
-      <p:nvGrpSpPr>
-        <p:cNvPr id="1" name=""/>
-        <p:cNvGrpSpPr/>
-        <p:nvPr/>
-      </p:nvGrpSpPr>
-      <p:grpSpPr>
-        <a:xfrm>
-          <a:off x="0" y="0"/>
-          <a:ext cx="0" cy="0"/>
-          <a:chOff x="0" y="0"/>
-          <a:chExt cx="0" cy="0"/>
-        </a:xfrm>
-      </p:grpSpPr>
-      <p:sp>
-        <p:nvSpPr>
-          <p:cNvPr id="2" name="Title 1"/>
-          <p:cNvSpPr>
-            <a:spLocks noGrp="1"/>
-          </p:cNvSpPr>
-          <p:nvPr>
-            <p:ph type="title"/>
-          </p:nvPr>
-        </p:nvSpPr>
-        <p:spPr/>
-        <p:txBody>
-          <a:bodyPr/>
-          <a:lstStyle/>
-          <a:p>
-            <a:r>
-              <a:rPr lang="en-US" dirty="0"/>
-              <a:t>Who are you to tell me???</a:t>
-            </a:r>
-          </a:p>
-        </p:txBody>
-      </p:sp>
-      <p:sp>
-        <p:nvSpPr>
-          <p:cNvPr id="3" name="Content Placeholder 2"/>
-          <p:cNvSpPr>
-            <a:spLocks noGrp="1"/>
-          </p:cNvSpPr>
-          <p:nvPr>
-            <p:ph idx="1"/>
-          </p:nvPr>
-        </p:nvSpPr>
-        <p:spPr/>
-        <p:txBody>
-          <a:bodyPr/>
-          <a:lstStyle/>
-          <a:p>
-            <a:r>
-              <a:rPr lang="en-US" dirty="0"/>
-              <a:t>Building SPAs for 4 years</a:t>
-            </a:r>
-          </a:p>
-          <a:p>
-            <a:r>
-              <a:rPr lang="en-US" dirty="0"/>
-              <a:t>Started with Angular 1 and ASP.NET Web API</a:t>
-            </a:r>
-          </a:p>
-          <a:p>
-            <a:r>
-              <a:rPr lang="en-US" dirty="0"/>
-              <a:t>Using Angular 2 in production today</a:t>
-            </a:r>
-          </a:p>
-        </p:txBody>
-      </p:sp>
-    </p:spTree>
-    <p:extLst>
-      <p:ext uri="{BB962C8B-B14F-4D97-AF65-F5344CB8AC3E}">
-        <p14:creationId xmlns:p14="http://schemas.microsoft.com/office/powerpoint/2010/main" val="2237232038"/>
-      </p:ext>
-    </p:extLst>
-  </p:cSld>
-  <p:clrMapOvr>
-    <a:masterClrMapping/>
-  </p:clrMapOvr>
-</p:sld>
-</file>
-
-<file path=ppt/slides/slide6.xml><?xml version="1.0" encoding="utf-8"?>
-<p:sld xmlns:a="http://schemas.openxmlformats.org/drawingml/2006/main" xmlns:r="http://schemas.openxmlformats.org/officeDocument/2006/relationships" xmlns:p="http://schemas.openxmlformats.org/presentationml/2006/main">
-  <p:cSld>
-    <p:spTree>
-      <p:nvGrpSpPr>
-        <p:cNvPr id="1" name=""/>
-        <p:cNvGrpSpPr/>
-        <p:nvPr/>
-      </p:nvGrpSpPr>
-      <p:grpSpPr>
-        <a:xfrm>
-          <a:off x="0" y="0"/>
-          <a:ext cx="0" cy="0"/>
-          <a:chOff x="0" y="0"/>
-          <a:chExt cx="0" cy="0"/>
-        </a:xfrm>
-      </p:grpSpPr>
-      <p:sp>
-        <p:nvSpPr>
-          <p:cNvPr id="2" name="Title 1"/>
-          <p:cNvSpPr>
-            <a:spLocks noGrp="1"/>
-          </p:cNvSpPr>
-          <p:nvPr>
-            <p:ph type="title"/>
-          </p:nvPr>
-        </p:nvSpPr>
-        <p:spPr/>
-        <p:txBody>
-          <a:bodyPr/>
-          <a:lstStyle/>
-          <a:p>
-            <a:r>
-              <a:rPr lang="en-US" dirty="0"/>
-              <a:t>So, why Angular 2?</a:t>
-            </a:r>
-          </a:p>
-        </p:txBody>
-      </p:sp>
-      <p:sp>
-        <p:nvSpPr>
-          <p:cNvPr id="3" name="Content Placeholder 2"/>
-          <p:cNvSpPr>
-            <a:spLocks noGrp="1"/>
-          </p:cNvSpPr>
-          <p:nvPr>
-            <p:ph idx="1"/>
-          </p:nvPr>
-        </p:nvSpPr>
-        <p:spPr/>
-        <p:txBody>
-          <a:bodyPr/>
-          <a:lstStyle/>
-          <a:p>
-            <a:r>
-              <a:rPr lang="en-US" dirty="0"/>
-              <a:t>Simpler</a:t>
-            </a:r>
-          </a:p>
-          <a:p>
-            <a:r>
-              <a:rPr lang="en-US" dirty="0"/>
-              <a:t>Faster</a:t>
-            </a:r>
-          </a:p>
-          <a:p>
-            <a:r>
-              <a:rPr lang="en-US" dirty="0"/>
-              <a:t>More powerful</a:t>
-            </a:r>
-          </a:p>
-        </p:txBody>
-      </p:sp>
-      <p:pic>
-        <p:nvPicPr>
-          <p:cNvPr id="6146" name="Picture 2" descr="https://angular.io/resources/images/logos/standard/shield-large.png"/>
-          <p:cNvPicPr>
-            <a:picLocks noChangeAspect="1" noChangeArrowheads="1"/>
-          </p:cNvPicPr>
-          <p:nvPr/>
-        </p:nvPicPr>
-        <p:blipFill>
-          <a:blip r:embed="rId2">
-            <a:extLst>
-              <a:ext uri="{28A0092B-C50C-407E-A947-70E740481C1C}">
-                <a14:useLocalDpi xmlns:a14="http://schemas.microsoft.com/office/drawing/2010/main" val="0"/>
-              </a:ext>
-            </a:extLst>
-          </a:blip>
-          <a:srcRect/>
-          <a:stretch>
-            <a:fillRect/>
-          </a:stretch>
-        </p:blipFill>
-        <p:spPr bwMode="auto">
-          <a:xfrm>
-            <a:off x="8777061" y="3638938"/>
-            <a:ext cx="1752600" cy="1905000"/>
-          </a:xfrm>
-          <a:prstGeom prst="rect">
-            <a:avLst/>
-          </a:prstGeom>
-          <a:noFill/>
-          <a:extLst>
-            <a:ext uri="{909E8E84-426E-40DD-AFC4-6F175D3DCCD1}">
-              <a14:hiddenFill xmlns:a14="http://schemas.microsoft.com/office/drawing/2010/main">
-                <a:solidFill>
-                  <a:srgbClr val="FFFFFF"/>
-                </a:solidFill>
-              </a14:hiddenFill>
-            </a:ext>
-          </a:extLst>
-        </p:spPr>
-      </p:pic>
-    </p:spTree>
-    <p:extLst>
-      <p:ext uri="{BB962C8B-B14F-4D97-AF65-F5344CB8AC3E}">
-        <p14:creationId xmlns:p14="http://schemas.microsoft.com/office/powerpoint/2010/main" val="3022462997"/>
-      </p:ext>
-    </p:extLst>
-  </p:cSld>
-  <p:clrMapOvr>
-    <a:masterClrMapping/>
-  </p:clrMapOvr>
-</p:sld>
-</file>
-
-<file path=ppt/slides/slide7.xml><?xml version="1.0" encoding="utf-8"?>
-<p:sld xmlns:a="http://schemas.openxmlformats.org/drawingml/2006/main" xmlns:r="http://schemas.openxmlformats.org/officeDocument/2006/relationships" xmlns:p="http://schemas.openxmlformats.org/presentationml/2006/main">
-  <p:cSld>
-    <p:spTree>
-      <p:nvGrpSpPr>
-        <p:cNvPr id="1" name=""/>
-        <p:cNvGrpSpPr/>
-        <p:nvPr/>
-      </p:nvGrpSpPr>
-      <p:grpSpPr>
-        <a:xfrm>
-          <a:off x="0" y="0"/>
-          <a:ext cx="0" cy="0"/>
-          <a:chOff x="0" y="0"/>
-          <a:chExt cx="0" cy="0"/>
-        </a:xfrm>
-      </p:grpSpPr>
-      <p:sp>
-        <p:nvSpPr>
-          <p:cNvPr id="2" name="Title 1"/>
-          <p:cNvSpPr>
-            <a:spLocks noGrp="1"/>
-          </p:cNvSpPr>
-          <p:nvPr>
-            <p:ph type="title"/>
-          </p:nvPr>
-        </p:nvSpPr>
-        <p:spPr/>
-        <p:txBody>
-          <a:bodyPr/>
-          <a:lstStyle/>
-          <a:p>
-            <a:r>
-              <a:rPr lang="en-US" dirty="0"/>
-              <a:t>Why NOT Angular 2?</a:t>
-            </a:r>
-          </a:p>
-        </p:txBody>
-      </p:sp>
-      <p:sp>
-        <p:nvSpPr>
-          <p:cNvPr id="3" name="Content Placeholder 2"/>
-          <p:cNvSpPr>
-            <a:spLocks noGrp="1"/>
-          </p:cNvSpPr>
-          <p:nvPr>
-            <p:ph idx="1"/>
-          </p:nvPr>
-        </p:nvSpPr>
-        <p:spPr/>
-        <p:txBody>
-          <a:bodyPr/>
-          <a:lstStyle/>
-          <a:p>
-            <a:r>
-              <a:rPr lang="en-US" dirty="0"/>
-              <a:t>Not a ton of third-party support… yet</a:t>
-            </a:r>
-          </a:p>
-          <a:p>
-            <a:r>
-              <a:rPr lang="en-US" dirty="0"/>
-              <a:t>Fresh out of beta</a:t>
-            </a:r>
-          </a:p>
-          <a:p>
-            <a:endParaRPr lang="en-US" dirty="0"/>
-          </a:p>
-        </p:txBody>
-      </p:sp>
-      <p:pic>
-        <p:nvPicPr>
-          <p:cNvPr id="4" name="Picture 2" descr="https://angular.io/resources/images/logos/standard/shield-large.png"/>
-          <p:cNvPicPr>
-            <a:picLocks noChangeAspect="1" noChangeArrowheads="1"/>
-          </p:cNvPicPr>
-          <p:nvPr/>
-        </p:nvPicPr>
-        <p:blipFill>
-          <a:blip r:embed="rId2">
-            <a:extLst>
-              <a:ext uri="{28A0092B-C50C-407E-A947-70E740481C1C}">
-                <a14:useLocalDpi xmlns:a14="http://schemas.microsoft.com/office/drawing/2010/main" val="0"/>
-              </a:ext>
-            </a:extLst>
-          </a:blip>
-          <a:srcRect/>
-          <a:stretch>
-            <a:fillRect/>
-          </a:stretch>
-        </p:blipFill>
-        <p:spPr bwMode="auto">
-          <a:xfrm>
-            <a:off x="8777061" y="3638938"/>
-            <a:ext cx="1752600" cy="1905000"/>
-          </a:xfrm>
-          <a:prstGeom prst="rect">
-            <a:avLst/>
-          </a:prstGeom>
-          <a:noFill/>
-          <a:extLst>
-            <a:ext uri="{909E8E84-426E-40DD-AFC4-6F175D3DCCD1}">
-              <a14:hiddenFill xmlns:a14="http://schemas.microsoft.com/office/drawing/2010/main">
-                <a:solidFill>
-                  <a:srgbClr val="FFFFFF"/>
-                </a:solidFill>
-              </a14:hiddenFill>
-            </a:ext>
-          </a:extLst>
-        </p:spPr>
-      </p:pic>
-    </p:spTree>
-    <p:extLst>
-      <p:ext uri="{BB962C8B-B14F-4D97-AF65-F5344CB8AC3E}">
-        <p14:creationId xmlns:p14="http://schemas.microsoft.com/office/powerpoint/2010/main" val="1681403486"/>
-      </p:ext>
-    </p:extLst>
-  </p:cSld>
-  <p:clrMapOvr>
-    <a:masterClrMapping/>
-  </p:clrMapOvr>
-</p:sld>
-</file>
-
-<file path=ppt/slides/slide8.xml><?xml version="1.0" encoding="utf-8"?>
-<p:sld xmlns:a="http://schemas.openxmlformats.org/drawingml/2006/main" xmlns:r="http://schemas.openxmlformats.org/officeDocument/2006/relationships" xmlns:p="http://schemas.openxmlformats.org/presentationml/2006/main">
-  <p:cSld>
-    <p:spTree>
-      <p:nvGrpSpPr>
-        <p:cNvPr id="1" name=""/>
-        <p:cNvGrpSpPr/>
-        <p:nvPr/>
-      </p:nvGrpSpPr>
-      <p:grpSpPr>
-        <a:xfrm>
-          <a:off x="0" y="0"/>
-          <a:ext cx="0" cy="0"/>
-          <a:chOff x="0" y="0"/>
-          <a:chExt cx="0" cy="0"/>
-        </a:xfrm>
-      </p:grpSpPr>
-      <p:sp>
-        <p:nvSpPr>
-          <p:cNvPr id="2" name="Title 1"/>
-          <p:cNvSpPr>
-            <a:spLocks noGrp="1"/>
-          </p:cNvSpPr>
-          <p:nvPr>
-            <p:ph type="title"/>
-          </p:nvPr>
-        </p:nvSpPr>
-        <p:spPr/>
-        <p:txBody>
-          <a:bodyPr/>
-          <a:lstStyle/>
-          <a:p>
-            <a:r>
-              <a:rPr lang="en-US" dirty="0"/>
-              <a:t>Why </a:t>
-            </a:r>
-            <a:r>
-              <a:rPr lang="en-US" dirty="0" err="1"/>
-              <a:t>TypeScript</a:t>
-            </a:r>
-            <a:r>
-              <a:rPr lang="en-US" dirty="0"/>
-              <a:t>?</a:t>
-            </a:r>
-          </a:p>
-        </p:txBody>
-      </p:sp>
-      <p:sp>
-        <p:nvSpPr>
-          <p:cNvPr id="3" name="Content Placeholder 2"/>
-          <p:cNvSpPr>
-            <a:spLocks noGrp="1"/>
-          </p:cNvSpPr>
-          <p:nvPr>
-            <p:ph idx="1"/>
-          </p:nvPr>
-        </p:nvSpPr>
-        <p:spPr/>
-        <p:txBody>
-          <a:bodyPr/>
-          <a:lstStyle/>
-          <a:p>
-            <a:r>
-              <a:rPr lang="en-US" dirty="0"/>
-              <a:t>De facto language for Angular 2</a:t>
-            </a:r>
-          </a:p>
-          <a:p>
-            <a:r>
-              <a:rPr lang="en-US" dirty="0"/>
-              <a:t>Lots of neat features</a:t>
-            </a:r>
-          </a:p>
-          <a:p>
-            <a:r>
-              <a:rPr lang="en-US" dirty="0"/>
-              <a:t>The future </a:t>
-            </a:r>
-            <a:r>
-              <a:rPr lang="en-US"/>
-              <a:t>of JavaScript, today</a:t>
-            </a:r>
-            <a:endParaRPr lang="en-US" dirty="0"/>
-          </a:p>
-          <a:p>
-            <a:r>
-              <a:rPr lang="en-US" dirty="0" err="1"/>
-              <a:t>AtScript</a:t>
-            </a:r>
-            <a:r>
-              <a:rPr lang="en-US" dirty="0"/>
-              <a:t> history</a:t>
-            </a:r>
-          </a:p>
-        </p:txBody>
-      </p:sp>
-      <p:pic>
-        <p:nvPicPr>
-          <p:cNvPr id="5122" name="Picture 2" descr="https://raw.githubusercontent.com/remojansen/logo.ts/master/ts.png"/>
-          <p:cNvPicPr>
-            <a:picLocks noChangeAspect="1" noChangeArrowheads="1"/>
-          </p:cNvPicPr>
-          <p:nvPr/>
-        </p:nvPicPr>
-        <p:blipFill>
-          <a:blip r:embed="rId2">
-            <a:extLst>
-              <a:ext uri="{28A0092B-C50C-407E-A947-70E740481C1C}">
-                <a14:useLocalDpi xmlns:a14="http://schemas.microsoft.com/office/drawing/2010/main" val="0"/>
-              </a:ext>
-            </a:extLst>
-          </a:blip>
-          <a:srcRect/>
-          <a:stretch>
-            <a:fillRect/>
-          </a:stretch>
-        </p:blipFill>
-        <p:spPr bwMode="auto">
-          <a:xfrm>
-            <a:off x="8637972" y="3732613"/>
-            <a:ext cx="2335505" cy="2335505"/>
-          </a:xfrm>
-          <a:prstGeom prst="rect">
-            <a:avLst/>
-          </a:prstGeom>
-          <a:noFill/>
-          <a:extLst>
-            <a:ext uri="{909E8E84-426E-40DD-AFC4-6F175D3DCCD1}">
-              <a14:hiddenFill xmlns:a14="http://schemas.microsoft.com/office/drawing/2010/main">
-                <a:solidFill>
-                  <a:srgbClr val="FFFFFF"/>
-                </a:solidFill>
-              </a14:hiddenFill>
-            </a:ext>
-          </a:extLst>
-        </p:spPr>
-      </p:pic>
-    </p:spTree>
-    <p:extLst>
-      <p:ext uri="{BB962C8B-B14F-4D97-AF65-F5344CB8AC3E}">
-        <p14:creationId xmlns:p14="http://schemas.microsoft.com/office/powerpoint/2010/main" val="1874453720"/>
-      </p:ext>
-    </p:extLst>
-  </p:cSld>
-  <p:clrMapOvr>
-    <a:masterClrMapping/>
-  </p:clrMapOvr>
-</p:sld>
-</file>
-
 <file path=ppt/slides/slide9.xml><?xml version="1.0" encoding="utf-8"?>
 <p:sld xmlns:a="http://schemas.openxmlformats.org/drawingml/2006/main" xmlns:r="http://schemas.openxmlformats.org/officeDocument/2006/relationships" xmlns:p="http://schemas.openxmlformats.org/presentationml/2006/main">
   <p:cSld>
@@ -6513,92 +4431,43 @@
           <a:p>
             <a:r>
               <a:rPr lang="en-US" dirty="0"/>
-              <a:t>Why not </a:t>
-            </a:r>
-            <a:r>
-              <a:rPr lang="en-US" dirty="0" err="1"/>
-              <a:t>TypeScript</a:t>
-            </a:r>
+              <a:t>Thankfully…</a:t>
+            </a:r>
+          </a:p>
+        </p:txBody>
+      </p:sp>
+      <p:sp>
+        <p:nvSpPr>
+          <p:cNvPr id="3" name="Content Placeholder 2"/>
+          <p:cNvSpPr>
+            <a:spLocks noGrp="1"/>
+          </p:cNvSpPr>
+          <p:nvPr>
+            <p:ph idx="1"/>
+          </p:nvPr>
+        </p:nvSpPr>
+        <p:spPr/>
+        <p:txBody>
+          <a:bodyPr/>
+          <a:lstStyle/>
+          <a:p>
             <a:r>
               <a:rPr lang="en-US" dirty="0"/>
-              <a:t>?</a:t>
-            </a:r>
-          </a:p>
-        </p:txBody>
-      </p:sp>
-      <p:sp>
-        <p:nvSpPr>
-          <p:cNvPr id="3" name="Content Placeholder 2"/>
-          <p:cNvSpPr>
-            <a:spLocks noGrp="1"/>
-          </p:cNvSpPr>
-          <p:nvPr>
-            <p:ph idx="1"/>
-          </p:nvPr>
-        </p:nvSpPr>
-        <p:spPr/>
-        <p:txBody>
-          <a:bodyPr/>
-          <a:lstStyle/>
+              <a:t>Everything I’m showing you today is mostly Angular 2</a:t>
+            </a:r>
+          </a:p>
           <a:p>
             <a:r>
               <a:rPr lang="en-US" dirty="0"/>
-              <a:t>Yet another layer on top of JavaScript</a:t>
-            </a:r>
-          </a:p>
-          <a:p>
-            <a:r>
-              <a:rPr lang="en-US" dirty="0"/>
-              <a:t>May not be around forever</a:t>
-            </a:r>
-          </a:p>
-        </p:txBody>
-      </p:sp>
-      <p:pic>
-        <p:nvPicPr>
-          <p:cNvPr id="5" name="Picture 2" descr="https://raw.githubusercontent.com/remojansen/logo.ts/master/ts.png"/>
-          <p:cNvPicPr>
-            <a:picLocks noChangeAspect="1" noChangeArrowheads="1"/>
-          </p:cNvPicPr>
-          <p:nvPr/>
-        </p:nvPicPr>
-        <p:blipFill>
-          <a:blip r:embed="rId2">
-            <a:extLst>
-              <a:ext uri="{28A0092B-C50C-407E-A947-70E740481C1C}">
-                <a14:useLocalDpi xmlns:a14="http://schemas.microsoft.com/office/drawing/2010/main" val="0"/>
-              </a:ext>
-            </a:extLst>
-          </a:blip>
-          <a:srcRect/>
-          <a:stretch>
-            <a:fillRect/>
-          </a:stretch>
-        </p:blipFill>
-        <p:spPr bwMode="auto">
-          <a:xfrm>
-            <a:off x="8637972" y="3732613"/>
-            <a:ext cx="2335505" cy="2335505"/>
-          </a:xfrm>
-          <a:prstGeom prst="rect">
-            <a:avLst/>
-          </a:prstGeom>
-          <a:noFill/>
-          <a:extLst>
-            <a:ext uri="{909E8E84-426E-40DD-AFC4-6F175D3DCCD1}">
-              <a14:hiddenFill xmlns:a14="http://schemas.microsoft.com/office/drawing/2010/main">
-                <a:solidFill>
-                  <a:srgbClr val="FFFFFF"/>
-                </a:solidFill>
-              </a14:hiddenFill>
-            </a:ext>
-          </a:extLst>
-        </p:spPr>
-      </p:pic>
+              <a:t>You can use ASP.NET 4.6 with Angular 2 – and I do!</a:t>
+            </a:r>
+          </a:p>
+        </p:txBody>
+      </p:sp>
     </p:spTree>
     <p:extLst>
       <p:ext uri="{BB962C8B-B14F-4D97-AF65-F5344CB8AC3E}">
-        <p14:creationId xmlns:p14="http://schemas.microsoft.com/office/powerpoint/2010/main" val="3750403352"/>
+        <p14:creationId xmlns:p14="http://schemas.microsoft.com/office/powerpoint/2010/main" val="3212732658"/>
       </p:ext>
     </p:extLst>
   </p:cSld>

</xml_diff>